<commit_message>
A bug in cnt_down has been fixed.
</commit_message>
<xml_diff>
--- a/0090_ber/rtl/schematic/cnt_down.pptx
+++ b/0090_ber/rtl/schematic/cnt_down.pptx
@@ -2,7 +2,7 @@
 <file path=ppt/presentation.xml><?xml version="1.0" encoding="utf-8"?>
 <p:presentation xmlns:a="http://schemas.openxmlformats.org/drawingml/2006/main" xmlns:r="http://schemas.openxmlformats.org/officeDocument/2006/relationships" xmlns:p="http://schemas.openxmlformats.org/presentationml/2006/main" saveSubsetFonts="1">
   <p:sldMasterIdLst>
-    <p:sldMasterId id="2147484321" r:id="rId1"/>
+    <p:sldMasterId id="2147484357" r:id="rId1"/>
   </p:sldMasterIdLst>
   <p:notesMasterIdLst>
     <p:notesMasterId r:id="rId3"/>
@@ -10,14 +10,14 @@
   <p:sldIdLst>
     <p:sldId id="262" r:id="rId2"/>
   </p:sldIdLst>
-  <p:sldSz cx="6400800" cy="4572000"/>
+  <p:sldSz cx="7315200" cy="5486400"/>
   <p:notesSz cx="6797675" cy="9926638"/>
   <p:defaultTextStyle>
     <a:defPPr>
       <a:defRPr lang="en-US"/>
     </a:defPPr>
-    <a:lvl1pPr marL="0" algn="l" defTabSz="371409" rtl="0" eaLnBrk="1" latinLnBrk="0" hangingPunct="1">
-      <a:defRPr sz="731" kern="1200">
+    <a:lvl1pPr marL="0" algn="l" defTabSz="216643" rtl="0" eaLnBrk="1" latinLnBrk="0" hangingPunct="1">
+      <a:defRPr sz="426" kern="1200">
         <a:solidFill>
           <a:schemeClr val="tx1"/>
         </a:solidFill>
@@ -26,8 +26,8 @@
         <a:cs typeface="+mn-cs"/>
       </a:defRPr>
     </a:lvl1pPr>
-    <a:lvl2pPr marL="185704" algn="l" defTabSz="371409" rtl="0" eaLnBrk="1" latinLnBrk="0" hangingPunct="1">
-      <a:defRPr sz="731" kern="1200">
+    <a:lvl2pPr marL="108321" algn="l" defTabSz="216643" rtl="0" eaLnBrk="1" latinLnBrk="0" hangingPunct="1">
+      <a:defRPr sz="426" kern="1200">
         <a:solidFill>
           <a:schemeClr val="tx1"/>
         </a:solidFill>
@@ -36,8 +36,8 @@
         <a:cs typeface="+mn-cs"/>
       </a:defRPr>
     </a:lvl2pPr>
-    <a:lvl3pPr marL="371409" algn="l" defTabSz="371409" rtl="0" eaLnBrk="1" latinLnBrk="0" hangingPunct="1">
-      <a:defRPr sz="731" kern="1200">
+    <a:lvl3pPr marL="216643" algn="l" defTabSz="216643" rtl="0" eaLnBrk="1" latinLnBrk="0" hangingPunct="1">
+      <a:defRPr sz="426" kern="1200">
         <a:solidFill>
           <a:schemeClr val="tx1"/>
         </a:solidFill>
@@ -46,8 +46,8 @@
         <a:cs typeface="+mn-cs"/>
       </a:defRPr>
     </a:lvl3pPr>
-    <a:lvl4pPr marL="557114" algn="l" defTabSz="371409" rtl="0" eaLnBrk="1" latinLnBrk="0" hangingPunct="1">
-      <a:defRPr sz="731" kern="1200">
+    <a:lvl4pPr marL="324965" algn="l" defTabSz="216643" rtl="0" eaLnBrk="1" latinLnBrk="0" hangingPunct="1">
+      <a:defRPr sz="426" kern="1200">
         <a:solidFill>
           <a:schemeClr val="tx1"/>
         </a:solidFill>
@@ -56,8 +56,8 @@
         <a:cs typeface="+mn-cs"/>
       </a:defRPr>
     </a:lvl4pPr>
-    <a:lvl5pPr marL="742817" algn="l" defTabSz="371409" rtl="0" eaLnBrk="1" latinLnBrk="0" hangingPunct="1">
-      <a:defRPr sz="731" kern="1200">
+    <a:lvl5pPr marL="433285" algn="l" defTabSz="216643" rtl="0" eaLnBrk="1" latinLnBrk="0" hangingPunct="1">
+      <a:defRPr sz="426" kern="1200">
         <a:solidFill>
           <a:schemeClr val="tx1"/>
         </a:solidFill>
@@ -66,8 +66,8 @@
         <a:cs typeface="+mn-cs"/>
       </a:defRPr>
     </a:lvl5pPr>
-    <a:lvl6pPr marL="928523" algn="l" defTabSz="371409" rtl="0" eaLnBrk="1" latinLnBrk="0" hangingPunct="1">
-      <a:defRPr sz="731" kern="1200">
+    <a:lvl6pPr marL="541607" algn="l" defTabSz="216643" rtl="0" eaLnBrk="1" latinLnBrk="0" hangingPunct="1">
+      <a:defRPr sz="426" kern="1200">
         <a:solidFill>
           <a:schemeClr val="tx1"/>
         </a:solidFill>
@@ -76,8 +76,8 @@
         <a:cs typeface="+mn-cs"/>
       </a:defRPr>
     </a:lvl6pPr>
-    <a:lvl7pPr marL="1114228" algn="l" defTabSz="371409" rtl="0" eaLnBrk="1" latinLnBrk="0" hangingPunct="1">
-      <a:defRPr sz="731" kern="1200">
+    <a:lvl7pPr marL="649929" algn="l" defTabSz="216643" rtl="0" eaLnBrk="1" latinLnBrk="0" hangingPunct="1">
+      <a:defRPr sz="426" kern="1200">
         <a:solidFill>
           <a:schemeClr val="tx1"/>
         </a:solidFill>
@@ -86,8 +86,8 @@
         <a:cs typeface="+mn-cs"/>
       </a:defRPr>
     </a:lvl7pPr>
-    <a:lvl8pPr marL="1299933" algn="l" defTabSz="371409" rtl="0" eaLnBrk="1" latinLnBrk="0" hangingPunct="1">
-      <a:defRPr sz="731" kern="1200">
+    <a:lvl8pPr marL="758251" algn="l" defTabSz="216643" rtl="0" eaLnBrk="1" latinLnBrk="0" hangingPunct="1">
+      <a:defRPr sz="426" kern="1200">
         <a:solidFill>
           <a:schemeClr val="tx1"/>
         </a:solidFill>
@@ -96,8 +96,8 @@
         <a:cs typeface="+mn-cs"/>
       </a:defRPr>
     </a:lvl8pPr>
-    <a:lvl9pPr marL="1485636" algn="l" defTabSz="371409" rtl="0" eaLnBrk="1" latinLnBrk="0" hangingPunct="1">
-      <a:defRPr sz="731" kern="1200">
+    <a:lvl9pPr marL="866571" algn="l" defTabSz="216643" rtl="0" eaLnBrk="1" latinLnBrk="0" hangingPunct="1">
+      <a:defRPr sz="426" kern="1200">
         <a:solidFill>
           <a:schemeClr val="tx1"/>
         </a:solidFill>
@@ -197,7 +197,7 @@
           <a:p>
             <a:fld id="{B9E5BF02-4A65-43B2-AA51-912306618617}" type="datetimeFigureOut">
               <a:rPr lang="en-US" smtClean="0"/>
-              <a:t>10/6/2017</a:t>
+              <a:t>10/12/2017</a:t>
             </a:fld>
             <a:endParaRPr lang="en-US"/>
           </a:p>
@@ -215,8 +215,8 @@
         </p:nvSpPr>
         <p:spPr>
           <a:xfrm>
-            <a:off x="1054100" y="1241425"/>
-            <a:ext cx="4689475" cy="3349625"/>
+            <a:off x="1165225" y="1241425"/>
+            <a:ext cx="4467225" cy="3349625"/>
           </a:xfrm>
           <a:prstGeom prst="rect">
             <a:avLst/>
@@ -371,8 +371,8 @@
   </p:cSld>
   <p:clrMap bg1="lt1" tx1="dk1" bg2="lt2" tx2="dk2" accent1="accent1" accent2="accent2" accent3="accent3" accent4="accent4" accent5="accent5" accent6="accent6" hlink="hlink" folHlink="folHlink"/>
   <p:notesStyle>
-    <a:lvl1pPr marL="0" algn="l" defTabSz="371409" rtl="0" eaLnBrk="1" latinLnBrk="0" hangingPunct="1">
-      <a:defRPr sz="488" kern="1200">
+    <a:lvl1pPr marL="0" algn="l" defTabSz="216643" rtl="0" eaLnBrk="1" latinLnBrk="0" hangingPunct="1">
+      <a:defRPr sz="285" kern="1200">
         <a:solidFill>
           <a:schemeClr val="tx1"/>
         </a:solidFill>
@@ -381,8 +381,8 @@
         <a:cs typeface="+mn-cs"/>
       </a:defRPr>
     </a:lvl1pPr>
-    <a:lvl2pPr marL="185704" algn="l" defTabSz="371409" rtl="0" eaLnBrk="1" latinLnBrk="0" hangingPunct="1">
-      <a:defRPr sz="488" kern="1200">
+    <a:lvl2pPr marL="108321" algn="l" defTabSz="216643" rtl="0" eaLnBrk="1" latinLnBrk="0" hangingPunct="1">
+      <a:defRPr sz="285" kern="1200">
         <a:solidFill>
           <a:schemeClr val="tx1"/>
         </a:solidFill>
@@ -391,8 +391,8 @@
         <a:cs typeface="+mn-cs"/>
       </a:defRPr>
     </a:lvl2pPr>
-    <a:lvl3pPr marL="371409" algn="l" defTabSz="371409" rtl="0" eaLnBrk="1" latinLnBrk="0" hangingPunct="1">
-      <a:defRPr sz="488" kern="1200">
+    <a:lvl3pPr marL="216643" algn="l" defTabSz="216643" rtl="0" eaLnBrk="1" latinLnBrk="0" hangingPunct="1">
+      <a:defRPr sz="285" kern="1200">
         <a:solidFill>
           <a:schemeClr val="tx1"/>
         </a:solidFill>
@@ -401,8 +401,8 @@
         <a:cs typeface="+mn-cs"/>
       </a:defRPr>
     </a:lvl3pPr>
-    <a:lvl4pPr marL="557114" algn="l" defTabSz="371409" rtl="0" eaLnBrk="1" latinLnBrk="0" hangingPunct="1">
-      <a:defRPr sz="488" kern="1200">
+    <a:lvl4pPr marL="324965" algn="l" defTabSz="216643" rtl="0" eaLnBrk="1" latinLnBrk="0" hangingPunct="1">
+      <a:defRPr sz="285" kern="1200">
         <a:solidFill>
           <a:schemeClr val="tx1"/>
         </a:solidFill>
@@ -411,8 +411,8 @@
         <a:cs typeface="+mn-cs"/>
       </a:defRPr>
     </a:lvl4pPr>
-    <a:lvl5pPr marL="742817" algn="l" defTabSz="371409" rtl="0" eaLnBrk="1" latinLnBrk="0" hangingPunct="1">
-      <a:defRPr sz="488" kern="1200">
+    <a:lvl5pPr marL="433285" algn="l" defTabSz="216643" rtl="0" eaLnBrk="1" latinLnBrk="0" hangingPunct="1">
+      <a:defRPr sz="285" kern="1200">
         <a:solidFill>
           <a:schemeClr val="tx1"/>
         </a:solidFill>
@@ -421,8 +421,8 @@
         <a:cs typeface="+mn-cs"/>
       </a:defRPr>
     </a:lvl5pPr>
-    <a:lvl6pPr marL="928523" algn="l" defTabSz="371409" rtl="0" eaLnBrk="1" latinLnBrk="0" hangingPunct="1">
-      <a:defRPr sz="488" kern="1200">
+    <a:lvl6pPr marL="541607" algn="l" defTabSz="216643" rtl="0" eaLnBrk="1" latinLnBrk="0" hangingPunct="1">
+      <a:defRPr sz="285" kern="1200">
         <a:solidFill>
           <a:schemeClr val="tx1"/>
         </a:solidFill>
@@ -431,8 +431,8 @@
         <a:cs typeface="+mn-cs"/>
       </a:defRPr>
     </a:lvl6pPr>
-    <a:lvl7pPr marL="1114228" algn="l" defTabSz="371409" rtl="0" eaLnBrk="1" latinLnBrk="0" hangingPunct="1">
-      <a:defRPr sz="488" kern="1200">
+    <a:lvl7pPr marL="649929" algn="l" defTabSz="216643" rtl="0" eaLnBrk="1" latinLnBrk="0" hangingPunct="1">
+      <a:defRPr sz="285" kern="1200">
         <a:solidFill>
           <a:schemeClr val="tx1"/>
         </a:solidFill>
@@ -441,8 +441,8 @@
         <a:cs typeface="+mn-cs"/>
       </a:defRPr>
     </a:lvl7pPr>
-    <a:lvl8pPr marL="1299933" algn="l" defTabSz="371409" rtl="0" eaLnBrk="1" latinLnBrk="0" hangingPunct="1">
-      <a:defRPr sz="488" kern="1200">
+    <a:lvl8pPr marL="758251" algn="l" defTabSz="216643" rtl="0" eaLnBrk="1" latinLnBrk="0" hangingPunct="1">
+      <a:defRPr sz="285" kern="1200">
         <a:solidFill>
           <a:schemeClr val="tx1"/>
         </a:solidFill>
@@ -451,8 +451,8 @@
         <a:cs typeface="+mn-cs"/>
       </a:defRPr>
     </a:lvl8pPr>
-    <a:lvl9pPr marL="1485636" algn="l" defTabSz="371409" rtl="0" eaLnBrk="1" latinLnBrk="0" hangingPunct="1">
-      <a:defRPr sz="488" kern="1200">
+    <a:lvl9pPr marL="866571" algn="l" defTabSz="216643" rtl="0" eaLnBrk="1" latinLnBrk="0" hangingPunct="1">
+      <a:defRPr sz="285" kern="1200">
         <a:solidFill>
           <a:schemeClr val="tx1"/>
         </a:solidFill>
@@ -494,8 +494,8 @@
         </p:nvSpPr>
         <p:spPr>
           <a:xfrm>
-            <a:off x="1054100" y="1241425"/>
-            <a:ext cx="4689475" cy="3349625"/>
+            <a:off x="1165225" y="1241425"/>
+            <a:ext cx="4467225" cy="3349625"/>
           </a:xfrm>
         </p:spPr>
       </p:sp>
@@ -583,15 +583,15 @@
         </p:nvSpPr>
         <p:spPr>
           <a:xfrm>
-            <a:off x="480060" y="748242"/>
-            <a:ext cx="5440680" cy="1591733"/>
+            <a:off x="548640" y="897890"/>
+            <a:ext cx="6217920" cy="1910080"/>
           </a:xfrm>
         </p:spPr>
         <p:txBody>
           <a:bodyPr anchor="b"/>
           <a:lstStyle>
             <a:lvl1pPr algn="ctr">
-              <a:defRPr sz="4000"/>
+              <a:defRPr sz="4800"/>
             </a:lvl1pPr>
           </a:lstStyle>
           <a:p>
@@ -615,8 +615,8 @@
         </p:nvSpPr>
         <p:spPr>
           <a:xfrm>
-            <a:off x="800100" y="2401359"/>
-            <a:ext cx="4800600" cy="1103841"/>
+            <a:off x="914400" y="2881630"/>
+            <a:ext cx="5486400" cy="1324610"/>
           </a:xfrm>
         </p:spPr>
         <p:txBody>
@@ -624,39 +624,39 @@
           <a:lstStyle>
             <a:lvl1pPr marL="0" indent="0" algn="ctr">
               <a:buNone/>
+              <a:defRPr sz="1920"/>
+            </a:lvl1pPr>
+            <a:lvl2pPr marL="365760" indent="0" algn="ctr">
+              <a:buNone/>
               <a:defRPr sz="1600"/>
-            </a:lvl1pPr>
-            <a:lvl2pPr marL="304815" indent="0" algn="ctr">
+            </a:lvl2pPr>
+            <a:lvl3pPr marL="731520" indent="0" algn="ctr">
               <a:buNone/>
-              <a:defRPr sz="1333"/>
-            </a:lvl2pPr>
-            <a:lvl3pPr marL="609630" indent="0" algn="ctr">
+              <a:defRPr sz="1440"/>
+            </a:lvl3pPr>
+            <a:lvl4pPr marL="1097280" indent="0" algn="ctr">
               <a:buNone/>
-              <a:defRPr sz="1200"/>
-            </a:lvl3pPr>
-            <a:lvl4pPr marL="914446" indent="0" algn="ctr">
+              <a:defRPr sz="1280"/>
+            </a:lvl4pPr>
+            <a:lvl5pPr marL="1463040" indent="0" algn="ctr">
               <a:buNone/>
-              <a:defRPr sz="1067"/>
-            </a:lvl4pPr>
-            <a:lvl5pPr marL="1219261" indent="0" algn="ctr">
+              <a:defRPr sz="1280"/>
+            </a:lvl5pPr>
+            <a:lvl6pPr marL="1828800" indent="0" algn="ctr">
               <a:buNone/>
-              <a:defRPr sz="1067"/>
-            </a:lvl5pPr>
-            <a:lvl6pPr marL="1524076" indent="0" algn="ctr">
+              <a:defRPr sz="1280"/>
+            </a:lvl6pPr>
+            <a:lvl7pPr marL="2194560" indent="0" algn="ctr">
               <a:buNone/>
-              <a:defRPr sz="1067"/>
-            </a:lvl6pPr>
-            <a:lvl7pPr marL="1828891" indent="0" algn="ctr">
+              <a:defRPr sz="1280"/>
+            </a:lvl7pPr>
+            <a:lvl8pPr marL="2560320" indent="0" algn="ctr">
               <a:buNone/>
-              <a:defRPr sz="1067"/>
-            </a:lvl7pPr>
-            <a:lvl8pPr marL="2133707" indent="0" algn="ctr">
+              <a:defRPr sz="1280"/>
+            </a:lvl8pPr>
+            <a:lvl9pPr marL="2926080" indent="0" algn="ctr">
               <a:buNone/>
-              <a:defRPr sz="1067"/>
-            </a:lvl8pPr>
-            <a:lvl9pPr marL="2438522" indent="0" algn="ctr">
-              <a:buNone/>
-              <a:defRPr sz="1067"/>
+              <a:defRPr sz="1280"/>
             </a:lvl9pPr>
           </a:lstStyle>
           <a:p>
@@ -685,7 +685,7 @@
           <a:p>
             <a:fld id="{F8F920B2-3E99-4C9D-9450-62A3DEC5476B}" type="datetimeFigureOut">
               <a:rPr lang="en-US" smtClean="0"/>
-              <a:t>10/6/2017</a:t>
+              <a:t>10/12/2017</a:t>
             </a:fld>
             <a:endParaRPr lang="en-US"/>
           </a:p>
@@ -736,7 +736,7 @@
     </p:spTree>
     <p:extLst>
       <p:ext uri="{BB962C8B-B14F-4D97-AF65-F5344CB8AC3E}">
-        <p14:creationId xmlns:p14="http://schemas.microsoft.com/office/powerpoint/2010/main" val="746228410"/>
+        <p14:creationId xmlns:p14="http://schemas.microsoft.com/office/powerpoint/2010/main" val="2168129121"/>
       </p:ext>
     </p:extLst>
   </p:cSld>
@@ -855,7 +855,7 @@
           <a:p>
             <a:fld id="{F8F920B2-3E99-4C9D-9450-62A3DEC5476B}" type="datetimeFigureOut">
               <a:rPr lang="en-US" smtClean="0"/>
-              <a:t>10/6/2017</a:t>
+              <a:t>10/12/2017</a:t>
             </a:fld>
             <a:endParaRPr lang="en-US"/>
           </a:p>
@@ -906,7 +906,7 @@
     </p:spTree>
     <p:extLst>
       <p:ext uri="{BB962C8B-B14F-4D97-AF65-F5344CB8AC3E}">
-        <p14:creationId xmlns:p14="http://schemas.microsoft.com/office/powerpoint/2010/main" val="3586260782"/>
+        <p14:creationId xmlns:p14="http://schemas.microsoft.com/office/powerpoint/2010/main" val="4166299527"/>
       </p:ext>
     </p:extLst>
   </p:cSld>
@@ -945,8 +945,8 @@
         </p:nvSpPr>
         <p:spPr>
           <a:xfrm>
-            <a:off x="4580573" y="243417"/>
-            <a:ext cx="1380173" cy="3874559"/>
+            <a:off x="5234940" y="292100"/>
+            <a:ext cx="1577340" cy="4649470"/>
           </a:xfrm>
         </p:spPr>
         <p:txBody>
@@ -973,8 +973,8 @@
         </p:nvSpPr>
         <p:spPr>
           <a:xfrm>
-            <a:off x="440055" y="243417"/>
-            <a:ext cx="4060508" cy="3874559"/>
+            <a:off x="502920" y="292100"/>
+            <a:ext cx="4640580" cy="4649470"/>
           </a:xfrm>
         </p:spPr>
         <p:txBody>
@@ -1035,7 +1035,7 @@
           <a:p>
             <a:fld id="{F8F920B2-3E99-4C9D-9450-62A3DEC5476B}" type="datetimeFigureOut">
               <a:rPr lang="en-US" smtClean="0"/>
-              <a:t>10/6/2017</a:t>
+              <a:t>10/12/2017</a:t>
             </a:fld>
             <a:endParaRPr lang="en-US"/>
           </a:p>
@@ -1086,7 +1086,7 @@
     </p:spTree>
     <p:extLst>
       <p:ext uri="{BB962C8B-B14F-4D97-AF65-F5344CB8AC3E}">
-        <p14:creationId xmlns:p14="http://schemas.microsoft.com/office/powerpoint/2010/main" val="2989987036"/>
+        <p14:creationId xmlns:p14="http://schemas.microsoft.com/office/powerpoint/2010/main" val="860675818"/>
       </p:ext>
     </p:extLst>
   </p:cSld>
@@ -1205,7 +1205,7 @@
           <a:p>
             <a:fld id="{F8F920B2-3E99-4C9D-9450-62A3DEC5476B}" type="datetimeFigureOut">
               <a:rPr lang="en-US" smtClean="0"/>
-              <a:t>10/6/2017</a:t>
+              <a:t>10/12/2017</a:t>
             </a:fld>
             <a:endParaRPr lang="en-US"/>
           </a:p>
@@ -1256,7 +1256,7 @@
     </p:spTree>
     <p:extLst>
       <p:ext uri="{BB962C8B-B14F-4D97-AF65-F5344CB8AC3E}">
-        <p14:creationId xmlns:p14="http://schemas.microsoft.com/office/powerpoint/2010/main" val="1298511666"/>
+        <p14:creationId xmlns:p14="http://schemas.microsoft.com/office/powerpoint/2010/main" val="2953517515"/>
       </p:ext>
     </p:extLst>
   </p:cSld>
@@ -1295,15 +1295,15 @@
         </p:nvSpPr>
         <p:spPr>
           <a:xfrm>
-            <a:off x="436722" y="1139826"/>
-            <a:ext cx="5520690" cy="1901825"/>
+            <a:off x="499110" y="1367791"/>
+            <a:ext cx="6309360" cy="2282190"/>
           </a:xfrm>
         </p:spPr>
         <p:txBody>
           <a:bodyPr anchor="b"/>
           <a:lstStyle>
             <a:lvl1pPr>
-              <a:defRPr sz="4000"/>
+              <a:defRPr sz="4800"/>
             </a:lvl1pPr>
           </a:lstStyle>
           <a:p>
@@ -1327,8 +1327,8 @@
         </p:nvSpPr>
         <p:spPr>
           <a:xfrm>
-            <a:off x="436722" y="3059643"/>
-            <a:ext cx="5520690" cy="1000125"/>
+            <a:off x="499110" y="3671571"/>
+            <a:ext cx="6309360" cy="1200150"/>
           </a:xfrm>
         </p:spPr>
         <p:txBody>
@@ -1336,15 +1336,15 @@
           <a:lstStyle>
             <a:lvl1pPr marL="0" indent="0">
               <a:buNone/>
-              <a:defRPr sz="1600">
+              <a:defRPr sz="1920">
                 <a:solidFill>
                   <a:schemeClr val="tx1"/>
                 </a:solidFill>
               </a:defRPr>
             </a:lvl1pPr>
-            <a:lvl2pPr marL="304815" indent="0">
+            <a:lvl2pPr marL="365760" indent="0">
               <a:buNone/>
-              <a:defRPr sz="1333">
+              <a:defRPr sz="1600">
                 <a:solidFill>
                   <a:schemeClr val="tx1">
                     <a:tint val="75000"/>
@@ -1352,9 +1352,9 @@
                 </a:solidFill>
               </a:defRPr>
             </a:lvl2pPr>
-            <a:lvl3pPr marL="609630" indent="0">
+            <a:lvl3pPr marL="731520" indent="0">
               <a:buNone/>
-              <a:defRPr sz="1200">
+              <a:defRPr sz="1440">
                 <a:solidFill>
                   <a:schemeClr val="tx1">
                     <a:tint val="75000"/>
@@ -1362,9 +1362,9 @@
                 </a:solidFill>
               </a:defRPr>
             </a:lvl3pPr>
-            <a:lvl4pPr marL="914446" indent="0">
+            <a:lvl4pPr marL="1097280" indent="0">
               <a:buNone/>
-              <a:defRPr sz="1067">
+              <a:defRPr sz="1280">
                 <a:solidFill>
                   <a:schemeClr val="tx1">
                     <a:tint val="75000"/>
@@ -1372,9 +1372,9 @@
                 </a:solidFill>
               </a:defRPr>
             </a:lvl4pPr>
-            <a:lvl5pPr marL="1219261" indent="0">
+            <a:lvl5pPr marL="1463040" indent="0">
               <a:buNone/>
-              <a:defRPr sz="1067">
+              <a:defRPr sz="1280">
                 <a:solidFill>
                   <a:schemeClr val="tx1">
                     <a:tint val="75000"/>
@@ -1382,9 +1382,9 @@
                 </a:solidFill>
               </a:defRPr>
             </a:lvl5pPr>
-            <a:lvl6pPr marL="1524076" indent="0">
+            <a:lvl6pPr marL="1828800" indent="0">
               <a:buNone/>
-              <a:defRPr sz="1067">
+              <a:defRPr sz="1280">
                 <a:solidFill>
                   <a:schemeClr val="tx1">
                     <a:tint val="75000"/>
@@ -1392,9 +1392,9 @@
                 </a:solidFill>
               </a:defRPr>
             </a:lvl6pPr>
-            <a:lvl7pPr marL="1828891" indent="0">
+            <a:lvl7pPr marL="2194560" indent="0">
               <a:buNone/>
-              <a:defRPr sz="1067">
+              <a:defRPr sz="1280">
                 <a:solidFill>
                   <a:schemeClr val="tx1">
                     <a:tint val="75000"/>
@@ -1402,9 +1402,9 @@
                 </a:solidFill>
               </a:defRPr>
             </a:lvl7pPr>
-            <a:lvl8pPr marL="2133707" indent="0">
+            <a:lvl8pPr marL="2560320" indent="0">
               <a:buNone/>
-              <a:defRPr sz="1067">
+              <a:defRPr sz="1280">
                 <a:solidFill>
                   <a:schemeClr val="tx1">
                     <a:tint val="75000"/>
@@ -1412,9 +1412,9 @@
                 </a:solidFill>
               </a:defRPr>
             </a:lvl8pPr>
-            <a:lvl9pPr marL="2438522" indent="0">
+            <a:lvl9pPr marL="2926080" indent="0">
               <a:buNone/>
-              <a:defRPr sz="1067">
+              <a:defRPr sz="1280">
                 <a:solidFill>
                   <a:schemeClr val="tx1">
                     <a:tint val="75000"/>
@@ -1449,7 +1449,7 @@
           <a:p>
             <a:fld id="{F8F920B2-3E99-4C9D-9450-62A3DEC5476B}" type="datetimeFigureOut">
               <a:rPr lang="en-US" smtClean="0"/>
-              <a:t>10/6/2017</a:t>
+              <a:t>10/12/2017</a:t>
             </a:fld>
             <a:endParaRPr lang="en-US"/>
           </a:p>
@@ -1500,7 +1500,7 @@
     </p:spTree>
     <p:extLst>
       <p:ext uri="{BB962C8B-B14F-4D97-AF65-F5344CB8AC3E}">
-        <p14:creationId xmlns:p14="http://schemas.microsoft.com/office/powerpoint/2010/main" val="414771798"/>
+        <p14:creationId xmlns:p14="http://schemas.microsoft.com/office/powerpoint/2010/main" val="2609566430"/>
       </p:ext>
     </p:extLst>
   </p:cSld>
@@ -1562,8 +1562,8 @@
         </p:nvSpPr>
         <p:spPr>
           <a:xfrm>
-            <a:off x="440055" y="1217083"/>
-            <a:ext cx="2720340" cy="2900892"/>
+            <a:off x="502920" y="1460500"/>
+            <a:ext cx="3108960" cy="3481070"/>
           </a:xfrm>
         </p:spPr>
         <p:txBody>
@@ -1619,8 +1619,8 @@
         </p:nvSpPr>
         <p:spPr>
           <a:xfrm>
-            <a:off x="3240405" y="1217083"/>
-            <a:ext cx="2720340" cy="2900892"/>
+            <a:off x="3703320" y="1460500"/>
+            <a:ext cx="3108960" cy="3481070"/>
           </a:xfrm>
         </p:spPr>
         <p:txBody>
@@ -1681,7 +1681,7 @@
           <a:p>
             <a:fld id="{F8F920B2-3E99-4C9D-9450-62A3DEC5476B}" type="datetimeFigureOut">
               <a:rPr lang="en-US" smtClean="0"/>
-              <a:t>10/6/2017</a:t>
+              <a:t>10/12/2017</a:t>
             </a:fld>
             <a:endParaRPr lang="en-US"/>
           </a:p>
@@ -1732,7 +1732,7 @@
     </p:spTree>
     <p:extLst>
       <p:ext uri="{BB962C8B-B14F-4D97-AF65-F5344CB8AC3E}">
-        <p14:creationId xmlns:p14="http://schemas.microsoft.com/office/powerpoint/2010/main" val="3546474812"/>
+        <p14:creationId xmlns:p14="http://schemas.microsoft.com/office/powerpoint/2010/main" val="364566443"/>
       </p:ext>
     </p:extLst>
   </p:cSld>
@@ -1771,8 +1771,8 @@
         </p:nvSpPr>
         <p:spPr>
           <a:xfrm>
-            <a:off x="440889" y="243418"/>
-            <a:ext cx="5520690" cy="883709"/>
+            <a:off x="503873" y="292101"/>
+            <a:ext cx="6309360" cy="1060450"/>
           </a:xfrm>
         </p:spPr>
         <p:txBody>
@@ -1799,8 +1799,8 @@
         </p:nvSpPr>
         <p:spPr>
           <a:xfrm>
-            <a:off x="440889" y="1120775"/>
-            <a:ext cx="2707838" cy="549275"/>
+            <a:off x="503874" y="1344930"/>
+            <a:ext cx="3094672" cy="659130"/>
           </a:xfrm>
         </p:spPr>
         <p:txBody>
@@ -1808,39 +1808,39 @@
           <a:lstStyle>
             <a:lvl1pPr marL="0" indent="0">
               <a:buNone/>
+              <a:defRPr sz="1920" b="1"/>
+            </a:lvl1pPr>
+            <a:lvl2pPr marL="365760" indent="0">
+              <a:buNone/>
               <a:defRPr sz="1600" b="1"/>
-            </a:lvl1pPr>
-            <a:lvl2pPr marL="304815" indent="0">
+            </a:lvl2pPr>
+            <a:lvl3pPr marL="731520" indent="0">
               <a:buNone/>
-              <a:defRPr sz="1333" b="1"/>
-            </a:lvl2pPr>
-            <a:lvl3pPr marL="609630" indent="0">
+              <a:defRPr sz="1440" b="1"/>
+            </a:lvl3pPr>
+            <a:lvl4pPr marL="1097280" indent="0">
               <a:buNone/>
-              <a:defRPr sz="1200" b="1"/>
-            </a:lvl3pPr>
-            <a:lvl4pPr marL="914446" indent="0">
+              <a:defRPr sz="1280" b="1"/>
+            </a:lvl4pPr>
+            <a:lvl5pPr marL="1463040" indent="0">
               <a:buNone/>
-              <a:defRPr sz="1067" b="1"/>
-            </a:lvl4pPr>
-            <a:lvl5pPr marL="1219261" indent="0">
+              <a:defRPr sz="1280" b="1"/>
+            </a:lvl5pPr>
+            <a:lvl6pPr marL="1828800" indent="0">
               <a:buNone/>
-              <a:defRPr sz="1067" b="1"/>
-            </a:lvl5pPr>
-            <a:lvl6pPr marL="1524076" indent="0">
+              <a:defRPr sz="1280" b="1"/>
+            </a:lvl6pPr>
+            <a:lvl7pPr marL="2194560" indent="0">
               <a:buNone/>
-              <a:defRPr sz="1067" b="1"/>
-            </a:lvl6pPr>
-            <a:lvl7pPr marL="1828891" indent="0">
+              <a:defRPr sz="1280" b="1"/>
+            </a:lvl7pPr>
+            <a:lvl8pPr marL="2560320" indent="0">
               <a:buNone/>
-              <a:defRPr sz="1067" b="1"/>
-            </a:lvl7pPr>
-            <a:lvl8pPr marL="2133707" indent="0">
+              <a:defRPr sz="1280" b="1"/>
+            </a:lvl8pPr>
+            <a:lvl9pPr marL="2926080" indent="0">
               <a:buNone/>
-              <a:defRPr sz="1067" b="1"/>
-            </a:lvl8pPr>
-            <a:lvl9pPr marL="2438522" indent="0">
-              <a:buNone/>
-              <a:defRPr sz="1067" b="1"/>
+              <a:defRPr sz="1280" b="1"/>
             </a:lvl9pPr>
           </a:lstStyle>
           <a:p>
@@ -1864,8 +1864,8 @@
         </p:nvSpPr>
         <p:spPr>
           <a:xfrm>
-            <a:off x="440889" y="1670050"/>
-            <a:ext cx="2707838" cy="2456392"/>
+            <a:off x="503874" y="2004060"/>
+            <a:ext cx="3094672" cy="2947670"/>
           </a:xfrm>
         </p:spPr>
         <p:txBody>
@@ -1921,8 +1921,8 @@
         </p:nvSpPr>
         <p:spPr>
           <a:xfrm>
-            <a:off x="3240405" y="1120775"/>
-            <a:ext cx="2721174" cy="549275"/>
+            <a:off x="3703320" y="1344930"/>
+            <a:ext cx="3109913" cy="659130"/>
           </a:xfrm>
         </p:spPr>
         <p:txBody>
@@ -1930,39 +1930,39 @@
           <a:lstStyle>
             <a:lvl1pPr marL="0" indent="0">
               <a:buNone/>
+              <a:defRPr sz="1920" b="1"/>
+            </a:lvl1pPr>
+            <a:lvl2pPr marL="365760" indent="0">
+              <a:buNone/>
               <a:defRPr sz="1600" b="1"/>
-            </a:lvl1pPr>
-            <a:lvl2pPr marL="304815" indent="0">
+            </a:lvl2pPr>
+            <a:lvl3pPr marL="731520" indent="0">
               <a:buNone/>
-              <a:defRPr sz="1333" b="1"/>
-            </a:lvl2pPr>
-            <a:lvl3pPr marL="609630" indent="0">
+              <a:defRPr sz="1440" b="1"/>
+            </a:lvl3pPr>
+            <a:lvl4pPr marL="1097280" indent="0">
               <a:buNone/>
-              <a:defRPr sz="1200" b="1"/>
-            </a:lvl3pPr>
-            <a:lvl4pPr marL="914446" indent="0">
+              <a:defRPr sz="1280" b="1"/>
+            </a:lvl4pPr>
+            <a:lvl5pPr marL="1463040" indent="0">
               <a:buNone/>
-              <a:defRPr sz="1067" b="1"/>
-            </a:lvl4pPr>
-            <a:lvl5pPr marL="1219261" indent="0">
+              <a:defRPr sz="1280" b="1"/>
+            </a:lvl5pPr>
+            <a:lvl6pPr marL="1828800" indent="0">
               <a:buNone/>
-              <a:defRPr sz="1067" b="1"/>
-            </a:lvl5pPr>
-            <a:lvl6pPr marL="1524076" indent="0">
+              <a:defRPr sz="1280" b="1"/>
+            </a:lvl6pPr>
+            <a:lvl7pPr marL="2194560" indent="0">
               <a:buNone/>
-              <a:defRPr sz="1067" b="1"/>
-            </a:lvl6pPr>
-            <a:lvl7pPr marL="1828891" indent="0">
+              <a:defRPr sz="1280" b="1"/>
+            </a:lvl7pPr>
+            <a:lvl8pPr marL="2560320" indent="0">
               <a:buNone/>
-              <a:defRPr sz="1067" b="1"/>
-            </a:lvl7pPr>
-            <a:lvl8pPr marL="2133707" indent="0">
+              <a:defRPr sz="1280" b="1"/>
+            </a:lvl8pPr>
+            <a:lvl9pPr marL="2926080" indent="0">
               <a:buNone/>
-              <a:defRPr sz="1067" b="1"/>
-            </a:lvl8pPr>
-            <a:lvl9pPr marL="2438522" indent="0">
-              <a:buNone/>
-              <a:defRPr sz="1067" b="1"/>
+              <a:defRPr sz="1280" b="1"/>
             </a:lvl9pPr>
           </a:lstStyle>
           <a:p>
@@ -1986,8 +1986,8 @@
         </p:nvSpPr>
         <p:spPr>
           <a:xfrm>
-            <a:off x="3240405" y="1670050"/>
-            <a:ext cx="2721174" cy="2456392"/>
+            <a:off x="3703320" y="2004060"/>
+            <a:ext cx="3109913" cy="2947670"/>
           </a:xfrm>
         </p:spPr>
         <p:txBody>
@@ -2048,7 +2048,7 @@
           <a:p>
             <a:fld id="{F8F920B2-3E99-4C9D-9450-62A3DEC5476B}" type="datetimeFigureOut">
               <a:rPr lang="en-US" smtClean="0"/>
-              <a:t>10/6/2017</a:t>
+              <a:t>10/12/2017</a:t>
             </a:fld>
             <a:endParaRPr lang="en-US"/>
           </a:p>
@@ -2099,7 +2099,7 @@
     </p:spTree>
     <p:extLst>
       <p:ext uri="{BB962C8B-B14F-4D97-AF65-F5344CB8AC3E}">
-        <p14:creationId xmlns:p14="http://schemas.microsoft.com/office/powerpoint/2010/main" val="2551208499"/>
+        <p14:creationId xmlns:p14="http://schemas.microsoft.com/office/powerpoint/2010/main" val="1566101272"/>
       </p:ext>
     </p:extLst>
   </p:cSld>
@@ -2166,7 +2166,7 @@
           <a:p>
             <a:fld id="{F8F920B2-3E99-4C9D-9450-62A3DEC5476B}" type="datetimeFigureOut">
               <a:rPr lang="en-US" smtClean="0"/>
-              <a:t>10/6/2017</a:t>
+              <a:t>10/12/2017</a:t>
             </a:fld>
             <a:endParaRPr lang="en-US"/>
           </a:p>
@@ -2217,7 +2217,7 @@
     </p:spTree>
     <p:extLst>
       <p:ext uri="{BB962C8B-B14F-4D97-AF65-F5344CB8AC3E}">
-        <p14:creationId xmlns:p14="http://schemas.microsoft.com/office/powerpoint/2010/main" val="23347470"/>
+        <p14:creationId xmlns:p14="http://schemas.microsoft.com/office/powerpoint/2010/main" val="2255781674"/>
       </p:ext>
     </p:extLst>
   </p:cSld>
@@ -2261,7 +2261,7 @@
           <a:p>
             <a:fld id="{F8F920B2-3E99-4C9D-9450-62A3DEC5476B}" type="datetimeFigureOut">
               <a:rPr lang="en-US" smtClean="0"/>
-              <a:t>10/6/2017</a:t>
+              <a:t>10/12/2017</a:t>
             </a:fld>
             <a:endParaRPr lang="en-US"/>
           </a:p>
@@ -2312,7 +2312,7 @@
     </p:spTree>
     <p:extLst>
       <p:ext uri="{BB962C8B-B14F-4D97-AF65-F5344CB8AC3E}">
-        <p14:creationId xmlns:p14="http://schemas.microsoft.com/office/powerpoint/2010/main" val="620921723"/>
+        <p14:creationId xmlns:p14="http://schemas.microsoft.com/office/powerpoint/2010/main" val="1966454123"/>
       </p:ext>
     </p:extLst>
   </p:cSld>
@@ -2351,15 +2351,15 @@
         </p:nvSpPr>
         <p:spPr>
           <a:xfrm>
-            <a:off x="440889" y="304800"/>
-            <a:ext cx="2064425" cy="1066800"/>
+            <a:off x="503873" y="365760"/>
+            <a:ext cx="2359342" cy="1280160"/>
           </a:xfrm>
         </p:spPr>
         <p:txBody>
           <a:bodyPr anchor="b"/>
           <a:lstStyle>
             <a:lvl1pPr>
-              <a:defRPr sz="2133"/>
+              <a:defRPr sz="2560"/>
             </a:lvl1pPr>
           </a:lstStyle>
           <a:p>
@@ -2383,39 +2383,39 @@
         </p:nvSpPr>
         <p:spPr>
           <a:xfrm>
-            <a:off x="2721174" y="658285"/>
-            <a:ext cx="3240405" cy="3249083"/>
+            <a:off x="3109913" y="789941"/>
+            <a:ext cx="3703320" cy="3898900"/>
           </a:xfrm>
         </p:spPr>
         <p:txBody>
           <a:bodyPr/>
           <a:lstStyle>
             <a:lvl1pPr>
-              <a:defRPr sz="2133"/>
+              <a:defRPr sz="2560"/>
             </a:lvl1pPr>
             <a:lvl2pPr>
-              <a:defRPr sz="1867"/>
+              <a:defRPr sz="2240"/>
             </a:lvl2pPr>
             <a:lvl3pPr>
-              <a:defRPr sz="1600"/>
+              <a:defRPr sz="1920"/>
             </a:lvl3pPr>
             <a:lvl4pPr>
-              <a:defRPr sz="1333"/>
+              <a:defRPr sz="1600"/>
             </a:lvl4pPr>
             <a:lvl5pPr>
-              <a:defRPr sz="1333"/>
+              <a:defRPr sz="1600"/>
             </a:lvl5pPr>
             <a:lvl6pPr>
-              <a:defRPr sz="1333"/>
+              <a:defRPr sz="1600"/>
             </a:lvl6pPr>
             <a:lvl7pPr>
-              <a:defRPr sz="1333"/>
+              <a:defRPr sz="1600"/>
             </a:lvl7pPr>
             <a:lvl8pPr>
-              <a:defRPr sz="1333"/>
+              <a:defRPr sz="1600"/>
             </a:lvl8pPr>
             <a:lvl9pPr>
-              <a:defRPr sz="1333"/>
+              <a:defRPr sz="1600"/>
             </a:lvl9pPr>
           </a:lstStyle>
           <a:p>
@@ -2468,8 +2468,8 @@
         </p:nvSpPr>
         <p:spPr>
           <a:xfrm>
-            <a:off x="440889" y="1371600"/>
-            <a:ext cx="2064425" cy="2541059"/>
+            <a:off x="503873" y="1645920"/>
+            <a:ext cx="2359342" cy="3049270"/>
           </a:xfrm>
         </p:spPr>
         <p:txBody>
@@ -2477,39 +2477,39 @@
           <a:lstStyle>
             <a:lvl1pPr marL="0" indent="0">
               <a:buNone/>
-              <a:defRPr sz="1067"/>
+              <a:defRPr sz="1280"/>
             </a:lvl1pPr>
-            <a:lvl2pPr marL="304815" indent="0">
+            <a:lvl2pPr marL="365760" indent="0">
               <a:buNone/>
-              <a:defRPr sz="933"/>
+              <a:defRPr sz="1120"/>
             </a:lvl2pPr>
-            <a:lvl3pPr marL="609630" indent="0">
+            <a:lvl3pPr marL="731520" indent="0">
+              <a:buNone/>
+              <a:defRPr sz="960"/>
+            </a:lvl3pPr>
+            <a:lvl4pPr marL="1097280" indent="0">
               <a:buNone/>
               <a:defRPr sz="800"/>
-            </a:lvl3pPr>
-            <a:lvl4pPr marL="914446" indent="0">
+            </a:lvl4pPr>
+            <a:lvl5pPr marL="1463040" indent="0">
               <a:buNone/>
-              <a:defRPr sz="667"/>
-            </a:lvl4pPr>
-            <a:lvl5pPr marL="1219261" indent="0">
+              <a:defRPr sz="800"/>
+            </a:lvl5pPr>
+            <a:lvl6pPr marL="1828800" indent="0">
               <a:buNone/>
-              <a:defRPr sz="667"/>
-            </a:lvl5pPr>
-            <a:lvl6pPr marL="1524076" indent="0">
+              <a:defRPr sz="800"/>
+            </a:lvl6pPr>
+            <a:lvl7pPr marL="2194560" indent="0">
               <a:buNone/>
-              <a:defRPr sz="667"/>
-            </a:lvl6pPr>
-            <a:lvl7pPr marL="1828891" indent="0">
+              <a:defRPr sz="800"/>
+            </a:lvl7pPr>
+            <a:lvl8pPr marL="2560320" indent="0">
               <a:buNone/>
-              <a:defRPr sz="667"/>
-            </a:lvl7pPr>
-            <a:lvl8pPr marL="2133707" indent="0">
+              <a:defRPr sz="800"/>
+            </a:lvl8pPr>
+            <a:lvl9pPr marL="2926080" indent="0">
               <a:buNone/>
-              <a:defRPr sz="667"/>
-            </a:lvl8pPr>
-            <a:lvl9pPr marL="2438522" indent="0">
-              <a:buNone/>
-              <a:defRPr sz="667"/>
+              <a:defRPr sz="800"/>
             </a:lvl9pPr>
           </a:lstStyle>
           <a:p>
@@ -2538,7 +2538,7 @@
           <a:p>
             <a:fld id="{F8F920B2-3E99-4C9D-9450-62A3DEC5476B}" type="datetimeFigureOut">
               <a:rPr lang="en-US" smtClean="0"/>
-              <a:t>10/6/2017</a:t>
+              <a:t>10/12/2017</a:t>
             </a:fld>
             <a:endParaRPr lang="en-US"/>
           </a:p>
@@ -2589,7 +2589,7 @@
     </p:spTree>
     <p:extLst>
       <p:ext uri="{BB962C8B-B14F-4D97-AF65-F5344CB8AC3E}">
-        <p14:creationId xmlns:p14="http://schemas.microsoft.com/office/powerpoint/2010/main" val="2587646477"/>
+        <p14:creationId xmlns:p14="http://schemas.microsoft.com/office/powerpoint/2010/main" val="985177924"/>
       </p:ext>
     </p:extLst>
   </p:cSld>
@@ -2628,15 +2628,15 @@
         </p:nvSpPr>
         <p:spPr>
           <a:xfrm>
-            <a:off x="440889" y="304800"/>
-            <a:ext cx="2064425" cy="1066800"/>
+            <a:off x="503873" y="365760"/>
+            <a:ext cx="2359342" cy="1280160"/>
           </a:xfrm>
         </p:spPr>
         <p:txBody>
           <a:bodyPr anchor="b"/>
           <a:lstStyle>
             <a:lvl1pPr>
-              <a:defRPr sz="2133"/>
+              <a:defRPr sz="2560"/>
             </a:lvl1pPr>
           </a:lstStyle>
           <a:p>
@@ -2660,8 +2660,8 @@
         </p:nvSpPr>
         <p:spPr>
           <a:xfrm>
-            <a:off x="2721174" y="658285"/>
-            <a:ext cx="3240405" cy="3249083"/>
+            <a:off x="3109913" y="789941"/>
+            <a:ext cx="3703320" cy="3898900"/>
           </a:xfrm>
         </p:spPr>
         <p:txBody>
@@ -2669,39 +2669,39 @@
           <a:lstStyle>
             <a:lvl1pPr marL="0" indent="0">
               <a:buNone/>
-              <a:defRPr sz="2133"/>
+              <a:defRPr sz="2560"/>
             </a:lvl1pPr>
-            <a:lvl2pPr marL="304815" indent="0">
+            <a:lvl2pPr marL="365760" indent="0">
               <a:buNone/>
-              <a:defRPr sz="1867"/>
+              <a:defRPr sz="2240"/>
             </a:lvl2pPr>
-            <a:lvl3pPr marL="609630" indent="0">
+            <a:lvl3pPr marL="731520" indent="0">
+              <a:buNone/>
+              <a:defRPr sz="1920"/>
+            </a:lvl3pPr>
+            <a:lvl4pPr marL="1097280" indent="0">
               <a:buNone/>
               <a:defRPr sz="1600"/>
-            </a:lvl3pPr>
-            <a:lvl4pPr marL="914446" indent="0">
+            </a:lvl4pPr>
+            <a:lvl5pPr marL="1463040" indent="0">
               <a:buNone/>
-              <a:defRPr sz="1333"/>
-            </a:lvl4pPr>
-            <a:lvl5pPr marL="1219261" indent="0">
+              <a:defRPr sz="1600"/>
+            </a:lvl5pPr>
+            <a:lvl6pPr marL="1828800" indent="0">
               <a:buNone/>
-              <a:defRPr sz="1333"/>
-            </a:lvl5pPr>
-            <a:lvl6pPr marL="1524076" indent="0">
+              <a:defRPr sz="1600"/>
+            </a:lvl6pPr>
+            <a:lvl7pPr marL="2194560" indent="0">
               <a:buNone/>
-              <a:defRPr sz="1333"/>
-            </a:lvl6pPr>
-            <a:lvl7pPr marL="1828891" indent="0">
+              <a:defRPr sz="1600"/>
+            </a:lvl7pPr>
+            <a:lvl8pPr marL="2560320" indent="0">
               <a:buNone/>
-              <a:defRPr sz="1333"/>
-            </a:lvl7pPr>
-            <a:lvl8pPr marL="2133707" indent="0">
+              <a:defRPr sz="1600"/>
+            </a:lvl8pPr>
+            <a:lvl9pPr marL="2926080" indent="0">
               <a:buNone/>
-              <a:defRPr sz="1333"/>
-            </a:lvl8pPr>
-            <a:lvl9pPr marL="2438522" indent="0">
-              <a:buNone/>
-              <a:defRPr sz="1333"/>
+              <a:defRPr sz="1600"/>
             </a:lvl9pPr>
           </a:lstStyle>
           <a:p>
@@ -2725,8 +2725,8 @@
         </p:nvSpPr>
         <p:spPr>
           <a:xfrm>
-            <a:off x="440889" y="1371600"/>
-            <a:ext cx="2064425" cy="2541059"/>
+            <a:off x="503873" y="1645920"/>
+            <a:ext cx="2359342" cy="3049270"/>
           </a:xfrm>
         </p:spPr>
         <p:txBody>
@@ -2734,39 +2734,39 @@
           <a:lstStyle>
             <a:lvl1pPr marL="0" indent="0">
               <a:buNone/>
-              <a:defRPr sz="1067"/>
+              <a:defRPr sz="1280"/>
             </a:lvl1pPr>
-            <a:lvl2pPr marL="304815" indent="0">
+            <a:lvl2pPr marL="365760" indent="0">
               <a:buNone/>
-              <a:defRPr sz="933"/>
+              <a:defRPr sz="1120"/>
             </a:lvl2pPr>
-            <a:lvl3pPr marL="609630" indent="0">
+            <a:lvl3pPr marL="731520" indent="0">
+              <a:buNone/>
+              <a:defRPr sz="960"/>
+            </a:lvl3pPr>
+            <a:lvl4pPr marL="1097280" indent="0">
               <a:buNone/>
               <a:defRPr sz="800"/>
-            </a:lvl3pPr>
-            <a:lvl4pPr marL="914446" indent="0">
+            </a:lvl4pPr>
+            <a:lvl5pPr marL="1463040" indent="0">
               <a:buNone/>
-              <a:defRPr sz="667"/>
-            </a:lvl4pPr>
-            <a:lvl5pPr marL="1219261" indent="0">
+              <a:defRPr sz="800"/>
+            </a:lvl5pPr>
+            <a:lvl6pPr marL="1828800" indent="0">
               <a:buNone/>
-              <a:defRPr sz="667"/>
-            </a:lvl5pPr>
-            <a:lvl6pPr marL="1524076" indent="0">
+              <a:defRPr sz="800"/>
+            </a:lvl6pPr>
+            <a:lvl7pPr marL="2194560" indent="0">
               <a:buNone/>
-              <a:defRPr sz="667"/>
-            </a:lvl6pPr>
-            <a:lvl7pPr marL="1828891" indent="0">
+              <a:defRPr sz="800"/>
+            </a:lvl7pPr>
+            <a:lvl8pPr marL="2560320" indent="0">
               <a:buNone/>
-              <a:defRPr sz="667"/>
-            </a:lvl7pPr>
-            <a:lvl8pPr marL="2133707" indent="0">
+              <a:defRPr sz="800"/>
+            </a:lvl8pPr>
+            <a:lvl9pPr marL="2926080" indent="0">
               <a:buNone/>
-              <a:defRPr sz="667"/>
-            </a:lvl8pPr>
-            <a:lvl9pPr marL="2438522" indent="0">
-              <a:buNone/>
-              <a:defRPr sz="667"/>
+              <a:defRPr sz="800"/>
             </a:lvl9pPr>
           </a:lstStyle>
           <a:p>
@@ -2795,7 +2795,7 @@
           <a:p>
             <a:fld id="{F8F920B2-3E99-4C9D-9450-62A3DEC5476B}" type="datetimeFigureOut">
               <a:rPr lang="en-US" smtClean="0"/>
-              <a:t>10/6/2017</a:t>
+              <a:t>10/12/2017</a:t>
             </a:fld>
             <a:endParaRPr lang="en-US"/>
           </a:p>
@@ -2846,7 +2846,7 @@
     </p:spTree>
     <p:extLst>
       <p:ext uri="{BB962C8B-B14F-4D97-AF65-F5344CB8AC3E}">
-        <p14:creationId xmlns:p14="http://schemas.microsoft.com/office/powerpoint/2010/main" val="2380427270"/>
+        <p14:creationId xmlns:p14="http://schemas.microsoft.com/office/powerpoint/2010/main" val="2585484534"/>
       </p:ext>
     </p:extLst>
   </p:cSld>
@@ -2890,8 +2890,8 @@
         </p:nvSpPr>
         <p:spPr>
           <a:xfrm>
-            <a:off x="440055" y="243418"/>
-            <a:ext cx="5520690" cy="883709"/>
+            <a:off x="502920" y="292101"/>
+            <a:ext cx="6309360" cy="1060450"/>
           </a:xfrm>
           <a:prstGeom prst="rect">
             <a:avLst/>
@@ -2923,8 +2923,8 @@
         </p:nvSpPr>
         <p:spPr>
           <a:xfrm>
-            <a:off x="440055" y="1217083"/>
-            <a:ext cx="5520690" cy="2900892"/>
+            <a:off x="502920" y="1460500"/>
+            <a:ext cx="6309360" cy="3481070"/>
           </a:xfrm>
           <a:prstGeom prst="rect">
             <a:avLst/>
@@ -2985,8 +2985,8 @@
         </p:nvSpPr>
         <p:spPr>
           <a:xfrm>
-            <a:off x="440055" y="4237568"/>
-            <a:ext cx="1440180" cy="243417"/>
+            <a:off x="502920" y="5085081"/>
+            <a:ext cx="1645920" cy="292100"/>
           </a:xfrm>
           <a:prstGeom prst="rect">
             <a:avLst/>
@@ -2996,7 +2996,7 @@
           <a:bodyPr vert="horz" lIns="91440" tIns="45720" rIns="91440" bIns="45720" rtlCol="0" anchor="ctr"/>
           <a:lstStyle>
             <a:lvl1pPr algn="l">
-              <a:defRPr sz="800">
+              <a:defRPr sz="960">
                 <a:solidFill>
                   <a:schemeClr val="tx1">
                     <a:tint val="75000"/>
@@ -3008,7 +3008,7 @@
           <a:p>
             <a:fld id="{F8F920B2-3E99-4C9D-9450-62A3DEC5476B}" type="datetimeFigureOut">
               <a:rPr lang="en-US" smtClean="0"/>
-              <a:t>10/6/2017</a:t>
+              <a:t>10/12/2017</a:t>
             </a:fld>
             <a:endParaRPr lang="en-US"/>
           </a:p>
@@ -3026,8 +3026,8 @@
         </p:nvSpPr>
         <p:spPr>
           <a:xfrm>
-            <a:off x="2120265" y="4237568"/>
-            <a:ext cx="2160270" cy="243417"/>
+            <a:off x="2423160" y="5085081"/>
+            <a:ext cx="2468880" cy="292100"/>
           </a:xfrm>
           <a:prstGeom prst="rect">
             <a:avLst/>
@@ -3037,7 +3037,7 @@
           <a:bodyPr vert="horz" lIns="91440" tIns="45720" rIns="91440" bIns="45720" rtlCol="0" anchor="ctr"/>
           <a:lstStyle>
             <a:lvl1pPr algn="ctr">
-              <a:defRPr sz="800">
+              <a:defRPr sz="960">
                 <a:solidFill>
                   <a:schemeClr val="tx1">
                     <a:tint val="75000"/>
@@ -3063,8 +3063,8 @@
         </p:nvSpPr>
         <p:spPr>
           <a:xfrm>
-            <a:off x="4520565" y="4237568"/>
-            <a:ext cx="1440180" cy="243417"/>
+            <a:off x="5166360" y="5085081"/>
+            <a:ext cx="1645920" cy="292100"/>
           </a:xfrm>
           <a:prstGeom prst="rect">
             <a:avLst/>
@@ -3074,7 +3074,7 @@
           <a:bodyPr vert="horz" lIns="91440" tIns="45720" rIns="91440" bIns="45720" rtlCol="0" anchor="ctr"/>
           <a:lstStyle>
             <a:lvl1pPr algn="r">
-              <a:defRPr sz="800">
+              <a:defRPr sz="960">
                 <a:solidFill>
                   <a:schemeClr val="tx1">
                     <a:tint val="75000"/>
@@ -3095,27 +3095,27 @@
     </p:spTree>
     <p:extLst>
       <p:ext uri="{BB962C8B-B14F-4D97-AF65-F5344CB8AC3E}">
-        <p14:creationId xmlns:p14="http://schemas.microsoft.com/office/powerpoint/2010/main" val="2802424716"/>
+        <p14:creationId xmlns:p14="http://schemas.microsoft.com/office/powerpoint/2010/main" val="1583512892"/>
       </p:ext>
     </p:extLst>
   </p:cSld>
   <p:clrMap bg1="lt1" tx1="dk1" bg2="lt2" tx2="dk2" accent1="accent1" accent2="accent2" accent3="accent3" accent4="accent4" accent5="accent5" accent6="accent6" hlink="hlink" folHlink="folHlink"/>
   <p:sldLayoutIdLst>
-    <p:sldLayoutId id="2147484322" r:id="rId1"/>
-    <p:sldLayoutId id="2147484323" r:id="rId2"/>
-    <p:sldLayoutId id="2147484324" r:id="rId3"/>
-    <p:sldLayoutId id="2147484325" r:id="rId4"/>
-    <p:sldLayoutId id="2147484326" r:id="rId5"/>
-    <p:sldLayoutId id="2147484327" r:id="rId6"/>
-    <p:sldLayoutId id="2147484328" r:id="rId7"/>
-    <p:sldLayoutId id="2147484329" r:id="rId8"/>
-    <p:sldLayoutId id="2147484330" r:id="rId9"/>
-    <p:sldLayoutId id="2147484331" r:id="rId10"/>
-    <p:sldLayoutId id="2147484332" r:id="rId11"/>
+    <p:sldLayoutId id="2147484358" r:id="rId1"/>
+    <p:sldLayoutId id="2147484359" r:id="rId2"/>
+    <p:sldLayoutId id="2147484360" r:id="rId3"/>
+    <p:sldLayoutId id="2147484361" r:id="rId4"/>
+    <p:sldLayoutId id="2147484362" r:id="rId5"/>
+    <p:sldLayoutId id="2147484363" r:id="rId6"/>
+    <p:sldLayoutId id="2147484364" r:id="rId7"/>
+    <p:sldLayoutId id="2147484365" r:id="rId8"/>
+    <p:sldLayoutId id="2147484366" r:id="rId9"/>
+    <p:sldLayoutId id="2147484367" r:id="rId10"/>
+    <p:sldLayoutId id="2147484368" r:id="rId11"/>
   </p:sldLayoutIdLst>
   <p:txStyles>
     <p:titleStyle>
-      <a:lvl1pPr algn="l" defTabSz="609630" rtl="0" eaLnBrk="1" latinLnBrk="0" hangingPunct="1">
+      <a:lvl1pPr algn="l" defTabSz="731520" rtl="0" eaLnBrk="1" latinLnBrk="0" hangingPunct="1">
         <a:lnSpc>
           <a:spcPct val="90000"/>
         </a:lnSpc>
@@ -3123,7 +3123,7 @@
           <a:spcPct val="0"/>
         </a:spcBef>
         <a:buNone/>
-        <a:defRPr sz="2933" kern="1200">
+        <a:defRPr sz="3520" kern="1200">
           <a:solidFill>
             <a:schemeClr val="tx1"/>
           </a:solidFill>
@@ -3134,16 +3134,16 @@
       </a:lvl1pPr>
     </p:titleStyle>
     <p:bodyStyle>
-      <a:lvl1pPr marL="152408" indent="-152408" algn="l" defTabSz="609630" rtl="0" eaLnBrk="1" latinLnBrk="0" hangingPunct="1">
+      <a:lvl1pPr marL="182880" indent="-182880" algn="l" defTabSz="731520" rtl="0" eaLnBrk="1" latinLnBrk="0" hangingPunct="1">
         <a:lnSpc>
           <a:spcPct val="90000"/>
         </a:lnSpc>
         <a:spcBef>
-          <a:spcPts val="667"/>
+          <a:spcPts val="800"/>
         </a:spcBef>
         <a:buFont typeface="Arial" panose="020B0604020202020204" pitchFamily="34" charset="0"/>
         <a:buChar char="•"/>
-        <a:defRPr sz="1867" kern="1200">
+        <a:defRPr sz="2240" kern="1200">
           <a:solidFill>
             <a:schemeClr val="tx1"/>
           </a:solidFill>
@@ -3152,12 +3152,30 @@
           <a:cs typeface="+mn-cs"/>
         </a:defRPr>
       </a:lvl1pPr>
-      <a:lvl2pPr marL="457223" indent="-152408" algn="l" defTabSz="609630" rtl="0" eaLnBrk="1" latinLnBrk="0" hangingPunct="1">
+      <a:lvl2pPr marL="548640" indent="-182880" algn="l" defTabSz="731520" rtl="0" eaLnBrk="1" latinLnBrk="0" hangingPunct="1">
         <a:lnSpc>
           <a:spcPct val="90000"/>
         </a:lnSpc>
         <a:spcBef>
-          <a:spcPts val="333"/>
+          <a:spcPts val="400"/>
+        </a:spcBef>
+        <a:buFont typeface="Arial" panose="020B0604020202020204" pitchFamily="34" charset="0"/>
+        <a:buChar char="•"/>
+        <a:defRPr sz="1920" kern="1200">
+          <a:solidFill>
+            <a:schemeClr val="tx1"/>
+          </a:solidFill>
+          <a:latin typeface="+mn-lt"/>
+          <a:ea typeface="+mn-ea"/>
+          <a:cs typeface="+mn-cs"/>
+        </a:defRPr>
+      </a:lvl2pPr>
+      <a:lvl3pPr marL="914400" indent="-182880" algn="l" defTabSz="731520" rtl="0" eaLnBrk="1" latinLnBrk="0" hangingPunct="1">
+        <a:lnSpc>
+          <a:spcPct val="90000"/>
+        </a:lnSpc>
+        <a:spcBef>
+          <a:spcPts val="400"/>
         </a:spcBef>
         <a:buFont typeface="Arial" panose="020B0604020202020204" pitchFamily="34" charset="0"/>
         <a:buChar char="•"/>
@@ -3169,35 +3187,17 @@
           <a:ea typeface="+mn-ea"/>
           <a:cs typeface="+mn-cs"/>
         </a:defRPr>
-      </a:lvl2pPr>
-      <a:lvl3pPr marL="762038" indent="-152408" algn="l" defTabSz="609630" rtl="0" eaLnBrk="1" latinLnBrk="0" hangingPunct="1">
+      </a:lvl3pPr>
+      <a:lvl4pPr marL="1280160" indent="-182880" algn="l" defTabSz="731520" rtl="0" eaLnBrk="1" latinLnBrk="0" hangingPunct="1">
         <a:lnSpc>
           <a:spcPct val="90000"/>
         </a:lnSpc>
         <a:spcBef>
-          <a:spcPts val="333"/>
+          <a:spcPts val="400"/>
         </a:spcBef>
         <a:buFont typeface="Arial" panose="020B0604020202020204" pitchFamily="34" charset="0"/>
         <a:buChar char="•"/>
-        <a:defRPr sz="1333" kern="1200">
-          <a:solidFill>
-            <a:schemeClr val="tx1"/>
-          </a:solidFill>
-          <a:latin typeface="+mn-lt"/>
-          <a:ea typeface="+mn-ea"/>
-          <a:cs typeface="+mn-cs"/>
-        </a:defRPr>
-      </a:lvl3pPr>
-      <a:lvl4pPr marL="1066853" indent="-152408" algn="l" defTabSz="609630" rtl="0" eaLnBrk="1" latinLnBrk="0" hangingPunct="1">
-        <a:lnSpc>
-          <a:spcPct val="90000"/>
-        </a:lnSpc>
-        <a:spcBef>
-          <a:spcPts val="333"/>
-        </a:spcBef>
-        <a:buFont typeface="Arial" panose="020B0604020202020204" pitchFamily="34" charset="0"/>
-        <a:buChar char="•"/>
-        <a:defRPr sz="1200" kern="1200">
+        <a:defRPr sz="1440" kern="1200">
           <a:solidFill>
             <a:schemeClr val="tx1"/>
           </a:solidFill>
@@ -3206,16 +3206,16 @@
           <a:cs typeface="+mn-cs"/>
         </a:defRPr>
       </a:lvl4pPr>
-      <a:lvl5pPr marL="1371669" indent="-152408" algn="l" defTabSz="609630" rtl="0" eaLnBrk="1" latinLnBrk="0" hangingPunct="1">
+      <a:lvl5pPr marL="1645920" indent="-182880" algn="l" defTabSz="731520" rtl="0" eaLnBrk="1" latinLnBrk="0" hangingPunct="1">
         <a:lnSpc>
           <a:spcPct val="90000"/>
         </a:lnSpc>
         <a:spcBef>
-          <a:spcPts val="333"/>
+          <a:spcPts val="400"/>
         </a:spcBef>
         <a:buFont typeface="Arial" panose="020B0604020202020204" pitchFamily="34" charset="0"/>
         <a:buChar char="•"/>
-        <a:defRPr sz="1200" kern="1200">
+        <a:defRPr sz="1440" kern="1200">
           <a:solidFill>
             <a:schemeClr val="tx1"/>
           </a:solidFill>
@@ -3224,16 +3224,16 @@
           <a:cs typeface="+mn-cs"/>
         </a:defRPr>
       </a:lvl5pPr>
-      <a:lvl6pPr marL="1676484" indent="-152408" algn="l" defTabSz="609630" rtl="0" eaLnBrk="1" latinLnBrk="0" hangingPunct="1">
+      <a:lvl6pPr marL="2011680" indent="-182880" algn="l" defTabSz="731520" rtl="0" eaLnBrk="1" latinLnBrk="0" hangingPunct="1">
         <a:lnSpc>
           <a:spcPct val="90000"/>
         </a:lnSpc>
         <a:spcBef>
-          <a:spcPts val="333"/>
+          <a:spcPts val="400"/>
         </a:spcBef>
         <a:buFont typeface="Arial" panose="020B0604020202020204" pitchFamily="34" charset="0"/>
         <a:buChar char="•"/>
-        <a:defRPr sz="1200" kern="1200">
+        <a:defRPr sz="1440" kern="1200">
           <a:solidFill>
             <a:schemeClr val="tx1"/>
           </a:solidFill>
@@ -3242,16 +3242,16 @@
           <a:cs typeface="+mn-cs"/>
         </a:defRPr>
       </a:lvl6pPr>
-      <a:lvl7pPr marL="1981299" indent="-152408" algn="l" defTabSz="609630" rtl="0" eaLnBrk="1" latinLnBrk="0" hangingPunct="1">
+      <a:lvl7pPr marL="2377440" indent="-182880" algn="l" defTabSz="731520" rtl="0" eaLnBrk="1" latinLnBrk="0" hangingPunct="1">
         <a:lnSpc>
           <a:spcPct val="90000"/>
         </a:lnSpc>
         <a:spcBef>
-          <a:spcPts val="333"/>
+          <a:spcPts val="400"/>
         </a:spcBef>
         <a:buFont typeface="Arial" panose="020B0604020202020204" pitchFamily="34" charset="0"/>
         <a:buChar char="•"/>
-        <a:defRPr sz="1200" kern="1200">
+        <a:defRPr sz="1440" kern="1200">
           <a:solidFill>
             <a:schemeClr val="tx1"/>
           </a:solidFill>
@@ -3260,16 +3260,16 @@
           <a:cs typeface="+mn-cs"/>
         </a:defRPr>
       </a:lvl7pPr>
-      <a:lvl8pPr marL="2286114" indent="-152408" algn="l" defTabSz="609630" rtl="0" eaLnBrk="1" latinLnBrk="0" hangingPunct="1">
+      <a:lvl8pPr marL="2743200" indent="-182880" algn="l" defTabSz="731520" rtl="0" eaLnBrk="1" latinLnBrk="0" hangingPunct="1">
         <a:lnSpc>
           <a:spcPct val="90000"/>
         </a:lnSpc>
         <a:spcBef>
-          <a:spcPts val="333"/>
+          <a:spcPts val="400"/>
         </a:spcBef>
         <a:buFont typeface="Arial" panose="020B0604020202020204" pitchFamily="34" charset="0"/>
         <a:buChar char="•"/>
-        <a:defRPr sz="1200" kern="1200">
+        <a:defRPr sz="1440" kern="1200">
           <a:solidFill>
             <a:schemeClr val="tx1"/>
           </a:solidFill>
@@ -3278,16 +3278,16 @@
           <a:cs typeface="+mn-cs"/>
         </a:defRPr>
       </a:lvl8pPr>
-      <a:lvl9pPr marL="2590930" indent="-152408" algn="l" defTabSz="609630" rtl="0" eaLnBrk="1" latinLnBrk="0" hangingPunct="1">
+      <a:lvl9pPr marL="3108960" indent="-182880" algn="l" defTabSz="731520" rtl="0" eaLnBrk="1" latinLnBrk="0" hangingPunct="1">
         <a:lnSpc>
           <a:spcPct val="90000"/>
         </a:lnSpc>
         <a:spcBef>
-          <a:spcPts val="333"/>
+          <a:spcPts val="400"/>
         </a:spcBef>
         <a:buFont typeface="Arial" panose="020B0604020202020204" pitchFamily="34" charset="0"/>
         <a:buChar char="•"/>
-        <a:defRPr sz="1200" kern="1200">
+        <a:defRPr sz="1440" kern="1200">
           <a:solidFill>
             <a:schemeClr val="tx1"/>
           </a:solidFill>
@@ -3301,8 +3301,8 @@
       <a:defPPr>
         <a:defRPr lang="en-US"/>
       </a:defPPr>
-      <a:lvl1pPr marL="0" algn="l" defTabSz="609630" rtl="0" eaLnBrk="1" latinLnBrk="0" hangingPunct="1">
-        <a:defRPr sz="1200" kern="1200">
+      <a:lvl1pPr marL="0" algn="l" defTabSz="731520" rtl="0" eaLnBrk="1" latinLnBrk="0" hangingPunct="1">
+        <a:defRPr sz="1440" kern="1200">
           <a:solidFill>
             <a:schemeClr val="tx1"/>
           </a:solidFill>
@@ -3311,8 +3311,8 @@
           <a:cs typeface="+mn-cs"/>
         </a:defRPr>
       </a:lvl1pPr>
-      <a:lvl2pPr marL="304815" algn="l" defTabSz="609630" rtl="0" eaLnBrk="1" latinLnBrk="0" hangingPunct="1">
-        <a:defRPr sz="1200" kern="1200">
+      <a:lvl2pPr marL="365760" algn="l" defTabSz="731520" rtl="0" eaLnBrk="1" latinLnBrk="0" hangingPunct="1">
+        <a:defRPr sz="1440" kern="1200">
           <a:solidFill>
             <a:schemeClr val="tx1"/>
           </a:solidFill>
@@ -3321,8 +3321,8 @@
           <a:cs typeface="+mn-cs"/>
         </a:defRPr>
       </a:lvl2pPr>
-      <a:lvl3pPr marL="609630" algn="l" defTabSz="609630" rtl="0" eaLnBrk="1" latinLnBrk="0" hangingPunct="1">
-        <a:defRPr sz="1200" kern="1200">
+      <a:lvl3pPr marL="731520" algn="l" defTabSz="731520" rtl="0" eaLnBrk="1" latinLnBrk="0" hangingPunct="1">
+        <a:defRPr sz="1440" kern="1200">
           <a:solidFill>
             <a:schemeClr val="tx1"/>
           </a:solidFill>
@@ -3331,8 +3331,8 @@
           <a:cs typeface="+mn-cs"/>
         </a:defRPr>
       </a:lvl3pPr>
-      <a:lvl4pPr marL="914446" algn="l" defTabSz="609630" rtl="0" eaLnBrk="1" latinLnBrk="0" hangingPunct="1">
-        <a:defRPr sz="1200" kern="1200">
+      <a:lvl4pPr marL="1097280" algn="l" defTabSz="731520" rtl="0" eaLnBrk="1" latinLnBrk="0" hangingPunct="1">
+        <a:defRPr sz="1440" kern="1200">
           <a:solidFill>
             <a:schemeClr val="tx1"/>
           </a:solidFill>
@@ -3341,8 +3341,8 @@
           <a:cs typeface="+mn-cs"/>
         </a:defRPr>
       </a:lvl4pPr>
-      <a:lvl5pPr marL="1219261" algn="l" defTabSz="609630" rtl="0" eaLnBrk="1" latinLnBrk="0" hangingPunct="1">
-        <a:defRPr sz="1200" kern="1200">
+      <a:lvl5pPr marL="1463040" algn="l" defTabSz="731520" rtl="0" eaLnBrk="1" latinLnBrk="0" hangingPunct="1">
+        <a:defRPr sz="1440" kern="1200">
           <a:solidFill>
             <a:schemeClr val="tx1"/>
           </a:solidFill>
@@ -3351,8 +3351,8 @@
           <a:cs typeface="+mn-cs"/>
         </a:defRPr>
       </a:lvl5pPr>
-      <a:lvl6pPr marL="1524076" algn="l" defTabSz="609630" rtl="0" eaLnBrk="1" latinLnBrk="0" hangingPunct="1">
-        <a:defRPr sz="1200" kern="1200">
+      <a:lvl6pPr marL="1828800" algn="l" defTabSz="731520" rtl="0" eaLnBrk="1" latinLnBrk="0" hangingPunct="1">
+        <a:defRPr sz="1440" kern="1200">
           <a:solidFill>
             <a:schemeClr val="tx1"/>
           </a:solidFill>
@@ -3361,8 +3361,8 @@
           <a:cs typeface="+mn-cs"/>
         </a:defRPr>
       </a:lvl6pPr>
-      <a:lvl7pPr marL="1828891" algn="l" defTabSz="609630" rtl="0" eaLnBrk="1" latinLnBrk="0" hangingPunct="1">
-        <a:defRPr sz="1200" kern="1200">
+      <a:lvl7pPr marL="2194560" algn="l" defTabSz="731520" rtl="0" eaLnBrk="1" latinLnBrk="0" hangingPunct="1">
+        <a:defRPr sz="1440" kern="1200">
           <a:solidFill>
             <a:schemeClr val="tx1"/>
           </a:solidFill>
@@ -3371,8 +3371,8 @@
           <a:cs typeface="+mn-cs"/>
         </a:defRPr>
       </a:lvl7pPr>
-      <a:lvl8pPr marL="2133707" algn="l" defTabSz="609630" rtl="0" eaLnBrk="1" latinLnBrk="0" hangingPunct="1">
-        <a:defRPr sz="1200" kern="1200">
+      <a:lvl8pPr marL="2560320" algn="l" defTabSz="731520" rtl="0" eaLnBrk="1" latinLnBrk="0" hangingPunct="1">
+        <a:defRPr sz="1440" kern="1200">
           <a:solidFill>
             <a:schemeClr val="tx1"/>
           </a:solidFill>
@@ -3381,8 +3381,8 @@
           <a:cs typeface="+mn-cs"/>
         </a:defRPr>
       </a:lvl8pPr>
-      <a:lvl9pPr marL="2438522" algn="l" defTabSz="609630" rtl="0" eaLnBrk="1" latinLnBrk="0" hangingPunct="1">
-        <a:defRPr sz="1200" kern="1200">
+      <a:lvl9pPr marL="2926080" algn="l" defTabSz="731520" rtl="0" eaLnBrk="1" latinLnBrk="0" hangingPunct="1">
+        <a:defRPr sz="1440" kern="1200">
           <a:solidFill>
             <a:schemeClr val="tx1"/>
           </a:solidFill>
@@ -3421,7 +3421,7 @@
         </p:nvSpPr>
         <p:spPr>
           <a:xfrm>
-            <a:off x="152400" y="685800"/>
+            <a:off x="457200" y="685800"/>
             <a:ext cx="1524000" cy="228600"/>
           </a:xfrm>
           <a:prstGeom prst="roundRect">
@@ -3489,7 +3489,7 @@
         </p:nvSpPr>
         <p:spPr>
           <a:xfrm>
-            <a:off x="1752600" y="2209800"/>
+            <a:off x="1295400" y="2667000"/>
             <a:ext cx="152400" cy="152400"/>
           </a:xfrm>
           <a:prstGeom prst="rect">
@@ -3524,7 +3524,7 @@
           <a:p>
             <a:pPr algn="ctr"/>
             <a:r>
-              <a:rPr lang="en-US" sz="900" dirty="0" smtClean="0">
+              <a:rPr lang="en-US" sz="900" dirty="0">
                 <a:solidFill>
                   <a:srgbClr val="000000"/>
                 </a:solidFill>
@@ -3553,8 +3553,8 @@
         </p:nvCxnSpPr>
         <p:spPr>
           <a:xfrm>
-            <a:off x="1828800" y="1676400"/>
-            <a:ext cx="0" cy="533400"/>
+            <a:off x="1371600" y="2286000"/>
+            <a:ext cx="0" cy="381000"/>
           </a:xfrm>
           <a:prstGeom prst="line">
             <a:avLst/>
@@ -3590,7 +3590,7 @@
         </p:nvSpPr>
         <p:spPr>
           <a:xfrm>
-            <a:off x="152400" y="2667000"/>
+            <a:off x="457200" y="3276600"/>
             <a:ext cx="228600" cy="152400"/>
           </a:xfrm>
           <a:prstGeom prst="homePlate">
@@ -3641,7 +3641,7 @@
         </p:nvCxnSpPr>
         <p:spPr>
           <a:xfrm flipV="1">
-            <a:off x="457200" y="2667000"/>
+            <a:off x="762000" y="3276600"/>
             <a:ext cx="152400" cy="152400"/>
           </a:xfrm>
           <a:prstGeom prst="line">
@@ -3678,7 +3678,7 @@
         </p:nvSpPr>
         <p:spPr>
           <a:xfrm>
-            <a:off x="457200" y="2590800"/>
+            <a:off x="762000" y="3200400"/>
             <a:ext cx="152400" cy="76200"/>
           </a:xfrm>
           <a:prstGeom prst="rect">
@@ -3731,7 +3731,7 @@
         </p:nvSpPr>
         <p:spPr>
           <a:xfrm>
-            <a:off x="685800" y="2590800"/>
+            <a:off x="990600" y="3200400"/>
             <a:ext cx="457200" cy="152400"/>
           </a:xfrm>
           <a:prstGeom prst="rect">
@@ -3783,7 +3783,7 @@
         </p:nvSpPr>
         <p:spPr>
           <a:xfrm>
-            <a:off x="152400" y="3581400"/>
+            <a:off x="457200" y="4191000"/>
             <a:ext cx="228600" cy="152400"/>
           </a:xfrm>
           <a:prstGeom prst="homePlate">
@@ -3834,7 +3834,7 @@
         </p:nvCxnSpPr>
         <p:spPr>
           <a:xfrm flipV="1">
-            <a:off x="457200" y="3581400"/>
+            <a:off x="762000" y="4191000"/>
             <a:ext cx="152400" cy="152400"/>
           </a:xfrm>
           <a:prstGeom prst="line">
@@ -3871,7 +3871,7 @@
         </p:nvSpPr>
         <p:spPr>
           <a:xfrm>
-            <a:off x="457200" y="3505200"/>
+            <a:off x="762000" y="4114800"/>
             <a:ext cx="152400" cy="76200"/>
           </a:xfrm>
           <a:prstGeom prst="rect">
@@ -3924,7 +3924,7 @@
         </p:nvSpPr>
         <p:spPr>
           <a:xfrm>
-            <a:off x="685800" y="3505200"/>
+            <a:off x="990600" y="4114800"/>
             <a:ext cx="457200" cy="152400"/>
           </a:xfrm>
           <a:prstGeom prst="rect">
@@ -3976,7 +3976,7 @@
         </p:nvSpPr>
         <p:spPr>
           <a:xfrm>
-            <a:off x="152400" y="1295400"/>
+            <a:off x="457200" y="1295400"/>
             <a:ext cx="228600" cy="152400"/>
           </a:xfrm>
           <a:prstGeom prst="homePlate">
@@ -4027,7 +4027,7 @@
         </p:nvCxnSpPr>
         <p:spPr>
           <a:xfrm flipV="1">
-            <a:off x="457200" y="1295400"/>
+            <a:off x="762000" y="1295400"/>
             <a:ext cx="152400" cy="152400"/>
           </a:xfrm>
           <a:prstGeom prst="line">
@@ -4064,7 +4064,7 @@
         </p:nvSpPr>
         <p:spPr>
           <a:xfrm>
-            <a:off x="457200" y="1219200"/>
+            <a:off x="762000" y="1219200"/>
             <a:ext cx="152400" cy="76200"/>
           </a:xfrm>
           <a:prstGeom prst="rect">
@@ -4117,7 +4117,7 @@
         </p:nvSpPr>
         <p:spPr>
           <a:xfrm>
-            <a:off x="685800" y="1219200"/>
+            <a:off x="990600" y="1219200"/>
             <a:ext cx="457200" cy="152400"/>
           </a:xfrm>
           <a:prstGeom prst="rect">
@@ -4171,7 +4171,7 @@
         </p:nvCxnSpPr>
         <p:spPr>
           <a:xfrm>
-            <a:off x="381000" y="1371600"/>
+            <a:off x="685800" y="1371600"/>
             <a:ext cx="3733800" cy="0"/>
           </a:xfrm>
           <a:prstGeom prst="line">
@@ -4208,7 +4208,7 @@
         </p:nvCxnSpPr>
         <p:spPr>
           <a:xfrm flipV="1">
-            <a:off x="3048000" y="2438400"/>
+            <a:off x="3352800" y="3048000"/>
             <a:ext cx="0" cy="609600"/>
           </a:xfrm>
           <a:prstGeom prst="line">
@@ -4247,7 +4247,7 @@
         </p:nvCxnSpPr>
         <p:spPr>
           <a:xfrm>
-            <a:off x="3352800" y="2286001"/>
+            <a:off x="3657600" y="2895604"/>
             <a:ext cx="609600" cy="13"/>
           </a:xfrm>
           <a:prstGeom prst="line">
@@ -4284,7 +4284,7 @@
         </p:nvSpPr>
         <p:spPr>
           <a:xfrm>
-            <a:off x="4800600" y="1600200"/>
+            <a:off x="5410200" y="1905000"/>
             <a:ext cx="152400" cy="152400"/>
           </a:xfrm>
           <a:prstGeom prst="rect">
@@ -4341,7 +4341,7 @@
         </p:nvCxnSpPr>
         <p:spPr>
           <a:xfrm>
-            <a:off x="381000" y="3048000"/>
+            <a:off x="685800" y="3657600"/>
             <a:ext cx="2667000" cy="0"/>
           </a:xfrm>
           <a:prstGeom prst="line">
@@ -4378,7 +4378,7 @@
         </p:nvSpPr>
         <p:spPr>
           <a:xfrm>
-            <a:off x="152400" y="2971800"/>
+            <a:off x="457200" y="3581400"/>
             <a:ext cx="228600" cy="152400"/>
           </a:xfrm>
           <a:prstGeom prst="homePlate">
@@ -4429,7 +4429,7 @@
         </p:nvCxnSpPr>
         <p:spPr>
           <a:xfrm flipV="1">
-            <a:off x="457200" y="2971800"/>
+            <a:off x="762000" y="3581400"/>
             <a:ext cx="152400" cy="152400"/>
           </a:xfrm>
           <a:prstGeom prst="line">
@@ -4466,7 +4466,7 @@
         </p:nvSpPr>
         <p:spPr>
           <a:xfrm>
-            <a:off x="457200" y="2895600"/>
+            <a:off x="762000" y="3505200"/>
             <a:ext cx="152400" cy="76200"/>
           </a:xfrm>
           <a:prstGeom prst="rect">
@@ -4519,7 +4519,7 @@
         </p:nvSpPr>
         <p:spPr>
           <a:xfrm>
-            <a:off x="685800" y="2895600"/>
+            <a:off x="990600" y="3505200"/>
             <a:ext cx="457200" cy="152400"/>
           </a:xfrm>
           <a:prstGeom prst="rect">
@@ -4571,7 +4571,7 @@
         </p:nvSpPr>
         <p:spPr>
           <a:xfrm>
-            <a:off x="152400" y="990600"/>
+            <a:off x="457200" y="990600"/>
             <a:ext cx="457200" cy="152400"/>
           </a:xfrm>
           <a:prstGeom prst="rect">
@@ -4623,7 +4623,7 @@
         </p:nvCxnSpPr>
         <p:spPr>
           <a:xfrm>
-            <a:off x="3657600" y="2286000"/>
+            <a:off x="3962400" y="2895600"/>
             <a:ext cx="0" cy="609600"/>
           </a:xfrm>
           <a:prstGeom prst="line">
@@ -4662,7 +4662,7 @@
         </p:nvCxnSpPr>
         <p:spPr>
           <a:xfrm>
-            <a:off x="381000" y="3352800"/>
+            <a:off x="685800" y="3962400"/>
             <a:ext cx="2895600" cy="0"/>
           </a:xfrm>
           <a:prstGeom prst="line">
@@ -4699,7 +4699,7 @@
         </p:nvSpPr>
         <p:spPr>
           <a:xfrm>
-            <a:off x="152400" y="3276600"/>
+            <a:off x="457200" y="3886200"/>
             <a:ext cx="228600" cy="152400"/>
           </a:xfrm>
           <a:prstGeom prst="homePlate">
@@ -4750,7 +4750,7 @@
         </p:nvCxnSpPr>
         <p:spPr>
           <a:xfrm flipV="1">
-            <a:off x="457200" y="3276600"/>
+            <a:off x="762000" y="3886200"/>
             <a:ext cx="152400" cy="152400"/>
           </a:xfrm>
           <a:prstGeom prst="line">
@@ -4787,7 +4787,7 @@
         </p:nvSpPr>
         <p:spPr>
           <a:xfrm>
-            <a:off x="457200" y="3200400"/>
+            <a:off x="762000" y="3810000"/>
             <a:ext cx="152400" cy="76200"/>
           </a:xfrm>
           <a:prstGeom prst="rect">
@@ -4840,7 +4840,7 @@
         </p:nvSpPr>
         <p:spPr>
           <a:xfrm>
-            <a:off x="685800" y="3200400"/>
+            <a:off x="990600" y="3810000"/>
             <a:ext cx="457200" cy="152400"/>
           </a:xfrm>
           <a:prstGeom prst="rect">
@@ -4892,7 +4892,7 @@
         </p:nvSpPr>
         <p:spPr>
           <a:xfrm>
-            <a:off x="6096000" y="2819400"/>
+            <a:off x="6705600" y="3429000"/>
             <a:ext cx="228600" cy="152400"/>
           </a:xfrm>
           <a:prstGeom prst="homePlate">
@@ -4945,8 +4945,8 @@
         </p:nvCxnSpPr>
         <p:spPr>
           <a:xfrm>
-            <a:off x="3657600" y="2895600"/>
-            <a:ext cx="2438400" cy="0"/>
+            <a:off x="3962400" y="3505200"/>
+            <a:ext cx="2743200" cy="0"/>
           </a:xfrm>
           <a:prstGeom prst="line">
             <a:avLst/>
@@ -4982,7 +4982,7 @@
         </p:nvCxnSpPr>
         <p:spPr>
           <a:xfrm flipV="1">
-            <a:off x="5867400" y="2819400"/>
+            <a:off x="6477000" y="3429000"/>
             <a:ext cx="152400" cy="152400"/>
           </a:xfrm>
           <a:prstGeom prst="line">
@@ -5019,7 +5019,7 @@
         </p:nvSpPr>
         <p:spPr>
           <a:xfrm>
-            <a:off x="5867400" y="2743200"/>
+            <a:off x="6477000" y="3352800"/>
             <a:ext cx="152400" cy="76200"/>
           </a:xfrm>
           <a:prstGeom prst="rect">
@@ -5072,7 +5072,7 @@
         </p:nvSpPr>
         <p:spPr>
           <a:xfrm>
-            <a:off x="5181600" y="2743200"/>
+            <a:off x="5791200" y="3352800"/>
             <a:ext cx="457200" cy="152400"/>
           </a:xfrm>
           <a:prstGeom prst="rect">
@@ -5124,7 +5124,7 @@
         </p:nvSpPr>
         <p:spPr>
           <a:xfrm>
-            <a:off x="6096000" y="2209800"/>
+            <a:off x="6705600" y="2819400"/>
             <a:ext cx="228600" cy="152400"/>
           </a:xfrm>
           <a:prstGeom prst="homePlate">
@@ -5177,8 +5177,8 @@
         </p:nvCxnSpPr>
         <p:spPr>
           <a:xfrm>
-            <a:off x="4267200" y="2286000"/>
-            <a:ext cx="1828800" cy="0"/>
+            <a:off x="4572000" y="2895600"/>
+            <a:ext cx="2133600" cy="0"/>
           </a:xfrm>
           <a:prstGeom prst="line">
             <a:avLst/>
@@ -5214,7 +5214,7 @@
         </p:nvCxnSpPr>
         <p:spPr>
           <a:xfrm flipV="1">
-            <a:off x="5867400" y="2209800"/>
+            <a:off x="6477000" y="2819400"/>
             <a:ext cx="152400" cy="152400"/>
           </a:xfrm>
           <a:prstGeom prst="line">
@@ -5251,7 +5251,7 @@
         </p:nvSpPr>
         <p:spPr>
           <a:xfrm>
-            <a:off x="5867400" y="2133600"/>
+            <a:off x="6477000" y="2743200"/>
             <a:ext cx="152400" cy="76200"/>
           </a:xfrm>
           <a:prstGeom prst="rect">
@@ -5304,7 +5304,7 @@
         </p:nvSpPr>
         <p:spPr>
           <a:xfrm>
-            <a:off x="5181600" y="2133600"/>
+            <a:off x="5791200" y="2743200"/>
             <a:ext cx="457200" cy="152400"/>
           </a:xfrm>
           <a:prstGeom prst="rect">
@@ -5356,7 +5356,7 @@
         </p:nvSpPr>
         <p:spPr>
           <a:xfrm>
-            <a:off x="6096000" y="1600200"/>
+            <a:off x="6705600" y="1600200"/>
             <a:ext cx="228600" cy="152400"/>
           </a:xfrm>
           <a:prstGeom prst="homePlate">
@@ -5403,15 +5403,14 @@
         <p:nvCxnSpPr>
           <p:cNvPr id="215" name="Straight Connector 214"/>
           <p:cNvCxnSpPr>
-            <a:stCxn id="146" idx="3"/>
             <a:endCxn id="213" idx="1"/>
           </p:cNvCxnSpPr>
           <p:nvPr/>
         </p:nvCxnSpPr>
         <p:spPr>
           <a:xfrm>
-            <a:off x="4953000" y="1676400"/>
-            <a:ext cx="1143000" cy="0"/>
+            <a:off x="2133600" y="1676400"/>
+            <a:ext cx="4572000" cy="0"/>
           </a:xfrm>
           <a:prstGeom prst="line">
             <a:avLst/>
@@ -5447,7 +5446,7 @@
         </p:nvCxnSpPr>
         <p:spPr>
           <a:xfrm flipV="1">
-            <a:off x="5867400" y="1600200"/>
+            <a:off x="6477000" y="1600200"/>
             <a:ext cx="152400" cy="152400"/>
           </a:xfrm>
           <a:prstGeom prst="line">
@@ -5484,7 +5483,7 @@
         </p:nvSpPr>
         <p:spPr>
           <a:xfrm>
-            <a:off x="5867400" y="1524000"/>
+            <a:off x="6477000" y="1524000"/>
             <a:ext cx="152400" cy="76200"/>
           </a:xfrm>
           <a:prstGeom prst="rect">
@@ -5537,7 +5536,7 @@
         </p:nvSpPr>
         <p:spPr>
           <a:xfrm>
-            <a:off x="5181600" y="1524000"/>
+            <a:off x="5791200" y="1524000"/>
             <a:ext cx="457200" cy="152400"/>
           </a:xfrm>
           <a:prstGeom prst="rect">
@@ -5589,7 +5588,7 @@
         </p:nvSpPr>
         <p:spPr>
           <a:xfrm>
-            <a:off x="3962400" y="2209801"/>
+            <a:off x="4267200" y="2819404"/>
             <a:ext cx="304800" cy="304793"/>
           </a:xfrm>
           <a:prstGeom prst="rect">
@@ -5635,7 +5634,7 @@
         </p:nvCxnSpPr>
         <p:spPr>
           <a:xfrm flipV="1">
-            <a:off x="4038601" y="2438366"/>
+            <a:off x="4343401" y="3047966"/>
             <a:ext cx="76200" cy="76200"/>
           </a:xfrm>
           <a:prstGeom prst="line">
@@ -5670,7 +5669,7 @@
         </p:nvCxnSpPr>
         <p:spPr>
           <a:xfrm flipH="1" flipV="1">
-            <a:off x="4114801" y="2438366"/>
+            <a:off x="4419601" y="3047966"/>
             <a:ext cx="76200" cy="76200"/>
           </a:xfrm>
           <a:prstGeom prst="line">
@@ -5705,7 +5704,7 @@
         </p:nvSpPr>
         <p:spPr>
           <a:xfrm>
-            <a:off x="4038600" y="2209773"/>
+            <a:off x="4343400" y="2819373"/>
             <a:ext cx="152400" cy="152400"/>
           </a:xfrm>
           <a:prstGeom prst="rect">
@@ -5758,7 +5757,7 @@
         </p:nvSpPr>
         <p:spPr>
           <a:xfrm rot="5400000">
-            <a:off x="3048000" y="2209800"/>
+            <a:off x="3352800" y="2819400"/>
             <a:ext cx="457200" cy="152400"/>
           </a:xfrm>
           <a:prstGeom prst="trapezoid">
@@ -5806,7 +5805,7 @@
         </p:nvSpPr>
         <p:spPr>
           <a:xfrm>
-            <a:off x="3200400" y="2133600"/>
+            <a:off x="3505200" y="2743200"/>
             <a:ext cx="152400" cy="152400"/>
           </a:xfrm>
           <a:prstGeom prst="rect">
@@ -5858,7 +5857,7 @@
         </p:nvSpPr>
         <p:spPr>
           <a:xfrm>
-            <a:off x="3200400" y="2286000"/>
+            <a:off x="3505200" y="2895600"/>
             <a:ext cx="152400" cy="152400"/>
           </a:xfrm>
           <a:prstGeom prst="rect">
@@ -5910,7 +5909,7 @@
         </p:nvCxnSpPr>
         <p:spPr>
           <a:xfrm flipV="1">
-            <a:off x="3276600" y="2438400"/>
+            <a:off x="3581400" y="3048000"/>
             <a:ext cx="0" cy="914400"/>
           </a:xfrm>
           <a:prstGeom prst="line">
@@ -5947,7 +5946,7 @@
         </p:nvSpPr>
         <p:spPr>
           <a:xfrm rot="5400000">
-            <a:off x="2286000" y="2057400"/>
+            <a:off x="2590800" y="2667000"/>
             <a:ext cx="457200" cy="152400"/>
           </a:xfrm>
           <a:prstGeom prst="trapezoid">
@@ -5995,7 +5994,7 @@
         </p:nvSpPr>
         <p:spPr>
           <a:xfrm>
-            <a:off x="2438400" y="1981200"/>
+            <a:off x="2743200" y="2590800"/>
             <a:ext cx="152400" cy="152400"/>
           </a:xfrm>
           <a:prstGeom prst="rect">
@@ -6047,7 +6046,7 @@
         </p:nvSpPr>
         <p:spPr>
           <a:xfrm>
-            <a:off x="2438400" y="2133600"/>
+            <a:off x="2743200" y="2743200"/>
             <a:ext cx="152400" cy="152400"/>
           </a:xfrm>
           <a:prstGeom prst="rect">
@@ -6101,7 +6100,7 @@
         </p:nvCxnSpPr>
         <p:spPr>
           <a:xfrm>
-            <a:off x="2590800" y="2133600"/>
+            <a:off x="2895600" y="2743200"/>
             <a:ext cx="609600" cy="0"/>
           </a:xfrm>
           <a:prstGeom prst="line">
@@ -6133,13 +6132,15 @@
       <p:cxnSp>
         <p:nvCxnSpPr>
           <p:cNvPr id="239" name="Straight Connector 238"/>
-          <p:cNvCxnSpPr/>
+          <p:cNvCxnSpPr>
+            <a:endCxn id="146" idx="2"/>
+          </p:cNvCxnSpPr>
           <p:nvPr/>
         </p:nvCxnSpPr>
         <p:spPr>
           <a:xfrm flipV="1">
-            <a:off x="4572000" y="1676400"/>
-            <a:ext cx="0" cy="609600"/>
+            <a:off x="5486400" y="2057400"/>
+            <a:ext cx="0" cy="838200"/>
           </a:xfrm>
           <a:prstGeom prst="line">
             <a:avLst/>
@@ -6149,7 +6150,7 @@
               <a:srgbClr val="000000"/>
             </a:solidFill>
             <a:headEnd type="oval" w="med" len="med"/>
-            <a:tailEnd type="oval" w="med" len="med"/>
+            <a:tailEnd type="triangle" w="med" len="med"/>
           </a:ln>
         </p:spPr>
         <p:style>
@@ -6169,16 +6170,88 @@
       </p:cxnSp>
       <p:cxnSp>
         <p:nvCxnSpPr>
-          <p:cNvPr id="240" name="Straight Connector 239"/>
-          <p:cNvCxnSpPr>
-            <a:endCxn id="146" idx="1"/>
-          </p:cNvCxnSpPr>
+          <p:cNvPr id="242" name="Straight Connector 241"/>
+          <p:cNvCxnSpPr/>
           <p:nvPr/>
         </p:nvCxnSpPr>
         <p:spPr>
           <a:xfrm>
-            <a:off x="1828800" y="1676400"/>
-            <a:ext cx="2971800" cy="0"/>
+            <a:off x="2438400" y="2286000"/>
+            <a:ext cx="0" cy="304800"/>
+          </a:xfrm>
+          <a:prstGeom prst="line">
+            <a:avLst/>
+          </a:prstGeom>
+          <a:ln w="12700">
+            <a:solidFill>
+              <a:srgbClr val="000000"/>
+            </a:solidFill>
+            <a:headEnd type="oval" w="med" len="med"/>
+            <a:tailEnd type="none" w="med" len="med"/>
+          </a:ln>
+        </p:spPr>
+        <p:style>
+          <a:lnRef idx="1">
+            <a:schemeClr val="accent1"/>
+          </a:lnRef>
+          <a:fillRef idx="0">
+            <a:schemeClr val="accent1"/>
+          </a:fillRef>
+          <a:effectRef idx="0">
+            <a:schemeClr val="accent1"/>
+          </a:effectRef>
+          <a:fontRef idx="minor">
+            <a:schemeClr val="tx1"/>
+          </a:fontRef>
+        </p:style>
+      </p:cxnSp>
+      <p:cxnSp>
+        <p:nvCxnSpPr>
+          <p:cNvPr id="243" name="Straight Connector 242"/>
+          <p:cNvCxnSpPr/>
+          <p:nvPr/>
+        </p:nvCxnSpPr>
+        <p:spPr>
+          <a:xfrm>
+            <a:off x="2209800" y="2895600"/>
+            <a:ext cx="533400" cy="0"/>
+          </a:xfrm>
+          <a:prstGeom prst="line">
+            <a:avLst/>
+          </a:prstGeom>
+          <a:ln w="12700">
+            <a:solidFill>
+              <a:srgbClr val="000000"/>
+            </a:solidFill>
+            <a:headEnd type="none" w="med" len="med"/>
+            <a:tailEnd type="none" w="med" len="med"/>
+          </a:ln>
+        </p:spPr>
+        <p:style>
+          <a:lnRef idx="1">
+            <a:schemeClr val="accent1"/>
+          </a:lnRef>
+          <a:fillRef idx="0">
+            <a:schemeClr val="accent1"/>
+          </a:fillRef>
+          <a:effectRef idx="0">
+            <a:schemeClr val="accent1"/>
+          </a:effectRef>
+          <a:fontRef idx="minor">
+            <a:schemeClr val="tx1"/>
+          </a:fontRef>
+        </p:style>
+      </p:cxnSp>
+      <p:cxnSp>
+        <p:nvCxnSpPr>
+          <p:cNvPr id="245" name="Straight Connector 244"/>
+          <p:cNvCxnSpPr/>
+          <p:nvPr/>
+        </p:nvCxnSpPr>
+        <p:spPr>
+          <a:xfrm>
+            <a:off x="990600" y="2743200"/>
+            <a:ext cx="304800" cy="0"/>
           </a:xfrm>
           <a:prstGeom prst="line">
             <a:avLst/>
@@ -6206,117 +6279,6 @@
           </a:fontRef>
         </p:style>
       </p:cxnSp>
-      <p:cxnSp>
-        <p:nvCxnSpPr>
-          <p:cNvPr id="242" name="Straight Connector 241"/>
-          <p:cNvCxnSpPr/>
-          <p:nvPr/>
-        </p:nvCxnSpPr>
-        <p:spPr>
-          <a:xfrm>
-            <a:off x="1828800" y="1981200"/>
-            <a:ext cx="609600" cy="0"/>
-          </a:xfrm>
-          <a:prstGeom prst="line">
-            <a:avLst/>
-          </a:prstGeom>
-          <a:ln w="12700">
-            <a:solidFill>
-              <a:srgbClr val="000000"/>
-            </a:solidFill>
-            <a:headEnd type="oval" w="med" len="med"/>
-            <a:tailEnd type="none" w="med" len="med"/>
-          </a:ln>
-        </p:spPr>
-        <p:style>
-          <a:lnRef idx="1">
-            <a:schemeClr val="accent1"/>
-          </a:lnRef>
-          <a:fillRef idx="0">
-            <a:schemeClr val="accent1"/>
-          </a:fillRef>
-          <a:effectRef idx="0">
-            <a:schemeClr val="accent1"/>
-          </a:effectRef>
-          <a:fontRef idx="minor">
-            <a:schemeClr val="tx1"/>
-          </a:fontRef>
-        </p:style>
-      </p:cxnSp>
-      <p:cxnSp>
-        <p:nvCxnSpPr>
-          <p:cNvPr id="243" name="Straight Connector 242"/>
-          <p:cNvCxnSpPr/>
-          <p:nvPr/>
-        </p:nvCxnSpPr>
-        <p:spPr>
-          <a:xfrm>
-            <a:off x="1905000" y="2286000"/>
-            <a:ext cx="533400" cy="0"/>
-          </a:xfrm>
-          <a:prstGeom prst="line">
-            <a:avLst/>
-          </a:prstGeom>
-          <a:ln w="12700">
-            <a:solidFill>
-              <a:srgbClr val="000000"/>
-            </a:solidFill>
-            <a:headEnd type="none" w="med" len="med"/>
-            <a:tailEnd type="none" w="med" len="med"/>
-          </a:ln>
-        </p:spPr>
-        <p:style>
-          <a:lnRef idx="1">
-            <a:schemeClr val="accent1"/>
-          </a:lnRef>
-          <a:fillRef idx="0">
-            <a:schemeClr val="accent1"/>
-          </a:fillRef>
-          <a:effectRef idx="0">
-            <a:schemeClr val="accent1"/>
-          </a:effectRef>
-          <a:fontRef idx="minor">
-            <a:schemeClr val="tx1"/>
-          </a:fontRef>
-        </p:style>
-      </p:cxnSp>
-      <p:cxnSp>
-        <p:nvCxnSpPr>
-          <p:cNvPr id="245" name="Straight Connector 244"/>
-          <p:cNvCxnSpPr/>
-          <p:nvPr/>
-        </p:nvCxnSpPr>
-        <p:spPr>
-          <a:xfrm>
-            <a:off x="1447800" y="2286000"/>
-            <a:ext cx="304800" cy="0"/>
-          </a:xfrm>
-          <a:prstGeom prst="line">
-            <a:avLst/>
-          </a:prstGeom>
-          <a:ln w="12700">
-            <a:solidFill>
-              <a:srgbClr val="000000"/>
-            </a:solidFill>
-            <a:headEnd type="none" w="med" len="med"/>
-            <a:tailEnd type="triangle" w="med" len="med"/>
-          </a:ln>
-        </p:spPr>
-        <p:style>
-          <a:lnRef idx="1">
-            <a:schemeClr val="accent1"/>
-          </a:lnRef>
-          <a:fillRef idx="0">
-            <a:schemeClr val="accent1"/>
-          </a:fillRef>
-          <a:effectRef idx="0">
-            <a:schemeClr val="accent1"/>
-          </a:effectRef>
-          <a:fontRef idx="minor">
-            <a:schemeClr val="tx1"/>
-          </a:fontRef>
-        </p:style>
-      </p:cxnSp>
       <p:sp>
         <p:nvSpPr>
           <p:cNvPr id="246" name="Rectangle 245"/>
@@ -6325,7 +6287,7 @@
         </p:nvSpPr>
         <p:spPr>
           <a:xfrm>
-            <a:off x="838200" y="2133600"/>
+            <a:off x="381000" y="2590800"/>
             <a:ext cx="914400" cy="152400"/>
           </a:xfrm>
           <a:prstGeom prst="rect">
@@ -6357,7 +6319,7 @@
           <a:lstStyle/>
           <a:p>
             <a:r>
-              <a:rPr lang="en-US" sz="900" dirty="0" smtClean="0">
+              <a:rPr lang="en-US" sz="900" dirty="0">
                 <a:solidFill>
                   <a:srgbClr val="000000"/>
                 </a:solidFill>
@@ -6384,7 +6346,7 @@
         </p:nvCxnSpPr>
         <p:spPr>
           <a:xfrm>
-            <a:off x="3048000" y="2438400"/>
+            <a:off x="3352800" y="3048000"/>
             <a:ext cx="152400" cy="0"/>
           </a:xfrm>
           <a:prstGeom prst="line">
@@ -6421,7 +6383,7 @@
         </p:nvCxnSpPr>
         <p:spPr>
           <a:xfrm flipV="1">
-            <a:off x="2514600" y="2286000"/>
+            <a:off x="2819400" y="2895600"/>
             <a:ext cx="0" cy="457200"/>
           </a:xfrm>
           <a:prstGeom prst="line">
@@ -6460,7 +6422,7 @@
         </p:nvCxnSpPr>
         <p:spPr>
           <a:xfrm>
-            <a:off x="381000" y="2743200"/>
+            <a:off x="685800" y="3352800"/>
             <a:ext cx="2133600" cy="0"/>
           </a:xfrm>
           <a:prstGeom prst="line">
@@ -6493,14 +6455,14 @@
         <p:nvCxnSpPr>
           <p:cNvPr id="256" name="Straight Connector 255"/>
           <p:cNvCxnSpPr>
-            <a:endCxn id="146" idx="0"/>
+            <a:endCxn id="146" idx="1"/>
           </p:cNvCxnSpPr>
           <p:nvPr/>
         </p:nvCxnSpPr>
         <p:spPr>
           <a:xfrm>
-            <a:off x="4876800" y="1371600"/>
-            <a:ext cx="0" cy="228600"/>
+            <a:off x="5181600" y="1981200"/>
+            <a:ext cx="228600" cy="0"/>
           </a:xfrm>
           <a:prstGeom prst="line">
             <a:avLst/>
@@ -6536,7 +6498,7 @@
         </p:nvSpPr>
         <p:spPr>
           <a:xfrm>
-            <a:off x="4419600" y="1219200"/>
+            <a:off x="4572000" y="1828800"/>
             <a:ext cx="914400" cy="152400"/>
           </a:xfrm>
           <a:prstGeom prst="rect">
@@ -6588,7 +6550,7 @@
         </p:nvCxnSpPr>
         <p:spPr>
           <a:xfrm flipV="1">
-            <a:off x="4114800" y="2514600"/>
+            <a:off x="4419600" y="3124200"/>
             <a:ext cx="0" cy="1143000"/>
           </a:xfrm>
           <a:prstGeom prst="line">
@@ -6627,7 +6589,7 @@
         </p:nvCxnSpPr>
         <p:spPr>
           <a:xfrm>
-            <a:off x="381000" y="3657600"/>
+            <a:off x="685800" y="4267200"/>
             <a:ext cx="3733800" cy="0"/>
           </a:xfrm>
           <a:prstGeom prst="line">
@@ -6664,7 +6626,7 @@
         </p:nvSpPr>
         <p:spPr>
           <a:xfrm>
-            <a:off x="4038600" y="2057400"/>
+            <a:off x="4343400" y="2667000"/>
             <a:ext cx="152400" cy="152400"/>
           </a:xfrm>
           <a:prstGeom prst="ellipse">
@@ -6715,8 +6677,421 @@
         </p:nvCxnSpPr>
         <p:spPr>
           <a:xfrm>
-            <a:off x="4114800" y="1371600"/>
-            <a:ext cx="0" cy="685800"/>
+            <a:off x="4419600" y="1371600"/>
+            <a:ext cx="0" cy="1295400"/>
+          </a:xfrm>
+          <a:prstGeom prst="line">
+            <a:avLst/>
+          </a:prstGeom>
+          <a:ln w="12700">
+            <a:solidFill>
+              <a:srgbClr val="000000"/>
+            </a:solidFill>
+            <a:headEnd type="none" w="med" len="med"/>
+            <a:tailEnd type="none" w="med" len="med"/>
+          </a:ln>
+        </p:spPr>
+        <p:style>
+          <a:lnRef idx="1">
+            <a:schemeClr val="accent1"/>
+          </a:lnRef>
+          <a:fillRef idx="0">
+            <a:schemeClr val="accent1"/>
+          </a:fillRef>
+          <a:effectRef idx="0">
+            <a:schemeClr val="accent1"/>
+          </a:effectRef>
+          <a:fontRef idx="minor">
+            <a:schemeClr val="tx1"/>
+          </a:fontRef>
+        </p:style>
+      </p:cxnSp>
+      <p:sp>
+        <p:nvSpPr>
+          <p:cNvPr id="75" name="Trapezoid 74"/>
+          <p:cNvSpPr/>
+          <p:nvPr/>
+        </p:nvSpPr>
+        <p:spPr>
+          <a:xfrm rot="5400000">
+            <a:off x="1905000" y="2819400"/>
+            <a:ext cx="457200" cy="152400"/>
+          </a:xfrm>
+          <a:prstGeom prst="trapezoid">
+            <a:avLst>
+              <a:gd name="adj" fmla="val 110715"/>
+            </a:avLst>
+          </a:prstGeom>
+          <a:noFill/>
+          <a:ln w="12700">
+            <a:solidFill>
+              <a:srgbClr val="000000"/>
+            </a:solidFill>
+          </a:ln>
+        </p:spPr>
+        <p:style>
+          <a:lnRef idx="2">
+            <a:schemeClr val="accent1">
+              <a:shade val="50000"/>
+            </a:schemeClr>
+          </a:lnRef>
+          <a:fillRef idx="1">
+            <a:schemeClr val="accent1"/>
+          </a:fillRef>
+          <a:effectRef idx="0">
+            <a:schemeClr val="accent1"/>
+          </a:effectRef>
+          <a:fontRef idx="minor">
+            <a:schemeClr val="lt1"/>
+          </a:fontRef>
+        </p:style>
+        <p:txBody>
+          <a:bodyPr rtlCol="0" anchor="ctr"/>
+          <a:lstStyle/>
+          <a:p>
+            <a:pPr algn="ctr"/>
+            <a:endParaRPr lang="en-US" sz="3730"/>
+          </a:p>
+        </p:txBody>
+      </p:sp>
+      <p:sp>
+        <p:nvSpPr>
+          <p:cNvPr id="76" name="Rectangle 75"/>
+          <p:cNvSpPr/>
+          <p:nvPr/>
+        </p:nvSpPr>
+        <p:spPr>
+          <a:xfrm>
+            <a:off x="2057400" y="2743200"/>
+            <a:ext cx="152400" cy="152400"/>
+          </a:xfrm>
+          <a:prstGeom prst="rect">
+            <a:avLst/>
+          </a:prstGeom>
+          <a:noFill/>
+          <a:ln>
+            <a:noFill/>
+          </a:ln>
+        </p:spPr>
+        <p:style>
+          <a:lnRef idx="2">
+            <a:schemeClr val="accent1">
+              <a:shade val="50000"/>
+            </a:schemeClr>
+          </a:lnRef>
+          <a:fillRef idx="1">
+            <a:schemeClr val="accent1"/>
+          </a:fillRef>
+          <a:effectRef idx="0">
+            <a:schemeClr val="accent1"/>
+          </a:effectRef>
+          <a:fontRef idx="minor">
+            <a:schemeClr val="lt1"/>
+          </a:fontRef>
+        </p:style>
+        <p:txBody>
+          <a:bodyPr wrap="none" lIns="45720" rIns="45720" rtlCol="0" anchor="ctr"/>
+          <a:lstStyle/>
+          <a:p>
+            <a:r>
+              <a:rPr lang="en-US" sz="900" dirty="0">
+                <a:solidFill>
+                  <a:srgbClr val="000000"/>
+                </a:solidFill>
+                <a:latin typeface="Courier New" panose="02070309020205020404" pitchFamily="49" charset="0"/>
+                <a:cs typeface="Courier New" panose="02070309020205020404" pitchFamily="49" charset="0"/>
+              </a:rPr>
+              <a:t>0</a:t>
+            </a:r>
+          </a:p>
+        </p:txBody>
+      </p:sp>
+      <p:sp>
+        <p:nvSpPr>
+          <p:cNvPr id="77" name="Rectangle 76"/>
+          <p:cNvSpPr/>
+          <p:nvPr/>
+        </p:nvSpPr>
+        <p:spPr>
+          <a:xfrm>
+            <a:off x="2057400" y="2895600"/>
+            <a:ext cx="152400" cy="152400"/>
+          </a:xfrm>
+          <a:prstGeom prst="rect">
+            <a:avLst/>
+          </a:prstGeom>
+          <a:noFill/>
+          <a:ln>
+            <a:noFill/>
+          </a:ln>
+        </p:spPr>
+        <p:style>
+          <a:lnRef idx="2">
+            <a:schemeClr val="accent1">
+              <a:shade val="50000"/>
+            </a:schemeClr>
+          </a:lnRef>
+          <a:fillRef idx="1">
+            <a:schemeClr val="accent1"/>
+          </a:fillRef>
+          <a:effectRef idx="0">
+            <a:schemeClr val="accent1"/>
+          </a:effectRef>
+          <a:fontRef idx="minor">
+            <a:schemeClr val="lt1"/>
+          </a:fontRef>
+        </p:style>
+        <p:txBody>
+          <a:bodyPr wrap="none" lIns="45720" rIns="45720" rtlCol="0" anchor="ctr"/>
+          <a:lstStyle/>
+          <a:p>
+            <a:r>
+              <a:rPr lang="en-US" sz="900" dirty="0">
+                <a:solidFill>
+                  <a:srgbClr val="000000"/>
+                </a:solidFill>
+                <a:latin typeface="Courier New" panose="02070309020205020404" pitchFamily="49" charset="0"/>
+                <a:cs typeface="Courier New" panose="02070309020205020404" pitchFamily="49" charset="0"/>
+              </a:rPr>
+              <a:t>1</a:t>
+            </a:r>
+          </a:p>
+        </p:txBody>
+      </p:sp>
+      <p:cxnSp>
+        <p:nvCxnSpPr>
+          <p:cNvPr id="78" name="Straight Connector 77"/>
+          <p:cNvCxnSpPr/>
+          <p:nvPr/>
+        </p:nvCxnSpPr>
+        <p:spPr>
+          <a:xfrm>
+            <a:off x="1905000" y="3048000"/>
+            <a:ext cx="152400" cy="0"/>
+          </a:xfrm>
+          <a:prstGeom prst="line">
+            <a:avLst/>
+          </a:prstGeom>
+          <a:ln w="12700">
+            <a:solidFill>
+              <a:srgbClr val="000000"/>
+            </a:solidFill>
+            <a:headEnd type="none" w="med" len="med"/>
+            <a:tailEnd type="none" w="med" len="med"/>
+          </a:ln>
+        </p:spPr>
+        <p:style>
+          <a:lnRef idx="1">
+            <a:schemeClr val="accent1"/>
+          </a:lnRef>
+          <a:fillRef idx="0">
+            <a:schemeClr val="accent1"/>
+          </a:fillRef>
+          <a:effectRef idx="0">
+            <a:schemeClr val="accent1"/>
+          </a:effectRef>
+          <a:fontRef idx="minor">
+            <a:schemeClr val="tx1"/>
+          </a:fontRef>
+        </p:style>
+      </p:cxnSp>
+      <p:cxnSp>
+        <p:nvCxnSpPr>
+          <p:cNvPr id="79" name="Straight Connector 78"/>
+          <p:cNvCxnSpPr/>
+          <p:nvPr/>
+        </p:nvCxnSpPr>
+        <p:spPr>
+          <a:xfrm flipV="1">
+            <a:off x="1905000" y="3048000"/>
+            <a:ext cx="0" cy="609600"/>
+          </a:xfrm>
+          <a:prstGeom prst="line">
+            <a:avLst/>
+          </a:prstGeom>
+          <a:ln w="12700">
+            <a:solidFill>
+              <a:srgbClr val="000000"/>
+            </a:solidFill>
+            <a:headEnd type="oval" w="med" len="med"/>
+            <a:tailEnd type="none" w="med" len="med"/>
+          </a:ln>
+        </p:spPr>
+        <p:style>
+          <a:lnRef idx="1">
+            <a:schemeClr val="accent1"/>
+          </a:lnRef>
+          <a:fillRef idx="0">
+            <a:schemeClr val="accent1"/>
+          </a:fillRef>
+          <a:effectRef idx="0">
+            <a:schemeClr val="accent1"/>
+          </a:effectRef>
+          <a:fontRef idx="minor">
+            <a:schemeClr val="tx1"/>
+          </a:fontRef>
+        </p:style>
+      </p:cxnSp>
+      <p:cxnSp>
+        <p:nvCxnSpPr>
+          <p:cNvPr id="84" name="Straight Connector 83"/>
+          <p:cNvCxnSpPr/>
+          <p:nvPr/>
+        </p:nvCxnSpPr>
+        <p:spPr>
+          <a:xfrm>
+            <a:off x="5486400" y="1676400"/>
+            <a:ext cx="0" cy="228600"/>
+          </a:xfrm>
+          <a:prstGeom prst="line">
+            <a:avLst/>
+          </a:prstGeom>
+          <a:ln w="12700">
+            <a:solidFill>
+              <a:srgbClr val="000000"/>
+            </a:solidFill>
+            <a:headEnd type="oval" w="med" len="med"/>
+            <a:tailEnd type="none" w="med" len="med"/>
+          </a:ln>
+        </p:spPr>
+        <p:style>
+          <a:lnRef idx="1">
+            <a:schemeClr val="accent1"/>
+          </a:lnRef>
+          <a:fillRef idx="0">
+            <a:schemeClr val="accent1"/>
+          </a:fillRef>
+          <a:effectRef idx="0">
+            <a:schemeClr val="accent1"/>
+          </a:effectRef>
+          <a:fontRef idx="minor">
+            <a:schemeClr val="tx1"/>
+          </a:fontRef>
+        </p:style>
+      </p:cxnSp>
+      <p:cxnSp>
+        <p:nvCxnSpPr>
+          <p:cNvPr id="90" name="Straight Connector 89"/>
+          <p:cNvCxnSpPr>
+            <a:stCxn id="265" idx="3"/>
+          </p:cNvCxnSpPr>
+          <p:nvPr/>
+        </p:nvCxnSpPr>
+        <p:spPr>
+          <a:xfrm>
+            <a:off x="1447800" y="2743200"/>
+            <a:ext cx="609600" cy="0"/>
+          </a:xfrm>
+          <a:prstGeom prst="line">
+            <a:avLst/>
+          </a:prstGeom>
+          <a:ln w="12700">
+            <a:solidFill>
+              <a:srgbClr val="000000"/>
+            </a:solidFill>
+            <a:headEnd type="none" w="med" len="med"/>
+            <a:tailEnd type="none" w="med" len="med"/>
+          </a:ln>
+        </p:spPr>
+        <p:style>
+          <a:lnRef idx="1">
+            <a:schemeClr val="accent1"/>
+          </a:lnRef>
+          <a:fillRef idx="0">
+            <a:schemeClr val="accent1"/>
+          </a:fillRef>
+          <a:effectRef idx="0">
+            <a:schemeClr val="accent1"/>
+          </a:effectRef>
+          <a:fontRef idx="minor">
+            <a:schemeClr val="tx1"/>
+          </a:fontRef>
+        </p:style>
+      </p:cxnSp>
+      <p:cxnSp>
+        <p:nvCxnSpPr>
+          <p:cNvPr id="96" name="Straight Connector 95"/>
+          <p:cNvCxnSpPr/>
+          <p:nvPr/>
+        </p:nvCxnSpPr>
+        <p:spPr>
+          <a:xfrm>
+            <a:off x="2438400" y="2590800"/>
+            <a:ext cx="304800" cy="0"/>
+          </a:xfrm>
+          <a:prstGeom prst="line">
+            <a:avLst/>
+          </a:prstGeom>
+          <a:ln w="12700">
+            <a:solidFill>
+              <a:srgbClr val="000000"/>
+            </a:solidFill>
+            <a:headEnd type="none" w="med" len="med"/>
+            <a:tailEnd type="none" w="med" len="med"/>
+          </a:ln>
+        </p:spPr>
+        <p:style>
+          <a:lnRef idx="1">
+            <a:schemeClr val="accent1"/>
+          </a:lnRef>
+          <a:fillRef idx="0">
+            <a:schemeClr val="accent1"/>
+          </a:fillRef>
+          <a:effectRef idx="0">
+            <a:schemeClr val="accent1"/>
+          </a:effectRef>
+          <a:fontRef idx="minor">
+            <a:schemeClr val="tx1"/>
+          </a:fontRef>
+        </p:style>
+      </p:cxnSp>
+      <p:cxnSp>
+        <p:nvCxnSpPr>
+          <p:cNvPr id="98" name="Straight Connector 97"/>
+          <p:cNvCxnSpPr/>
+          <p:nvPr/>
+        </p:nvCxnSpPr>
+        <p:spPr>
+          <a:xfrm flipH="1">
+            <a:off x="1371600" y="2286000"/>
+            <a:ext cx="4114800" cy="0"/>
+          </a:xfrm>
+          <a:prstGeom prst="line">
+            <a:avLst/>
+          </a:prstGeom>
+          <a:ln w="12700">
+            <a:solidFill>
+              <a:srgbClr val="000000"/>
+            </a:solidFill>
+            <a:headEnd type="oval" w="med" len="med"/>
+            <a:tailEnd type="none" w="med" len="med"/>
+          </a:ln>
+        </p:spPr>
+        <p:style>
+          <a:lnRef idx="1">
+            <a:schemeClr val="accent1"/>
+          </a:lnRef>
+          <a:fillRef idx="0">
+            <a:schemeClr val="accent1"/>
+          </a:fillRef>
+          <a:effectRef idx="0">
+            <a:schemeClr val="accent1"/>
+          </a:effectRef>
+          <a:fontRef idx="minor">
+            <a:schemeClr val="tx1"/>
+          </a:fontRef>
+        </p:style>
+      </p:cxnSp>
+      <p:cxnSp>
+        <p:nvCxnSpPr>
+          <p:cNvPr id="102" name="Straight Connector 101"/>
+          <p:cNvCxnSpPr/>
+          <p:nvPr/>
+        </p:nvCxnSpPr>
+        <p:spPr>
+          <a:xfrm>
+            <a:off x="2133600" y="1676400"/>
+            <a:ext cx="0" cy="1066800"/>
           </a:xfrm>
           <a:prstGeom prst="line">
             <a:avLst/>

</xml_diff>